<commit_message>
RxJS und Uebung 8
</commit_message>
<xml_diff>
--- a/React.pptx
+++ b/React.pptx
@@ -5,7 +5,7 @@
     <p:sldMasterId id="2147483673" r:id="rId1"/>
   </p:sldMasterIdLst>
   <p:notesMasterIdLst>
-    <p:notesMasterId r:id="rId38"/>
+    <p:notesMasterId r:id="rId44"/>
   </p:notesMasterIdLst>
   <p:sldIdLst>
     <p:sldId id="256" r:id="rId2"/>
@@ -43,7 +43,13 @@
     <p:sldId id="291" r:id="rId34"/>
     <p:sldId id="289" r:id="rId35"/>
     <p:sldId id="292" r:id="rId36"/>
-    <p:sldId id="272" r:id="rId37"/>
+    <p:sldId id="293" r:id="rId37"/>
+    <p:sldId id="272" r:id="rId38"/>
+    <p:sldId id="294" r:id="rId39"/>
+    <p:sldId id="295" r:id="rId40"/>
+    <p:sldId id="296" r:id="rId41"/>
+    <p:sldId id="297" r:id="rId42"/>
+    <p:sldId id="298" r:id="rId43"/>
   </p:sldIdLst>
   <p:sldSz cx="11522075" cy="6480175"/>
   <p:notesSz cx="6858000" cy="9144000"/>
@@ -312,7 +318,7 @@
           <a:p>
             <a:fld id="{05408900-6234-440B-A027-38F10FF7E2F1}" type="datetimeFigureOut">
               <a:rPr lang="de-DE" smtClean="0"/>
-              <a:t>21.10.2018</a:t>
+              <a:t>30.10.2018</a:t>
             </a:fld>
             <a:endParaRPr lang="de-DE"/>
           </a:p>
@@ -1180,7 +1186,7 @@
           <a:p>
             <a:fld id="{3B23B96D-9616-4176-AEF6-AF1317711023}" type="datetime1">
               <a:rPr lang="de-DE" smtClean="0"/>
-              <a:t>21.10.2018</a:t>
+              <a:t>30.10.2018</a:t>
             </a:fld>
             <a:endParaRPr lang="de-DE"/>
           </a:p>
@@ -1358,7 +1364,7 @@
           <a:p>
             <a:fld id="{0D71886E-8C9D-4E97-9EB5-D99BA89A8533}" type="datetime1">
               <a:rPr lang="de-DE" smtClean="0"/>
-              <a:t>21.10.2018</a:t>
+              <a:t>30.10.2018</a:t>
             </a:fld>
             <a:endParaRPr lang="de-DE"/>
           </a:p>
@@ -1499,7 +1505,7 @@
           <a:p>
             <a:fld id="{8DBF69B3-62E3-4AF4-971E-1AB7F9FB69DD}" type="datetime1">
               <a:rPr lang="de-DE" smtClean="0"/>
-              <a:t>21.10.2018</a:t>
+              <a:t>30.10.2018</a:t>
             </a:fld>
             <a:endParaRPr lang="de-DE"/>
           </a:p>
@@ -1783,7 +1789,7 @@
           <a:p>
             <a:fld id="{F898127A-2E85-486B-8AA5-E90E3CCEC0E9}" type="datetime1">
               <a:rPr lang="de-DE" smtClean="0"/>
-              <a:t>21.10.2018</a:t>
+              <a:t>30.10.2018</a:t>
             </a:fld>
             <a:endParaRPr lang="de-DE"/>
           </a:p>
@@ -2421,7 +2427,7 @@
           <a:p>
             <a:fld id="{A4FEDFCE-8709-4D76-8036-EE5278C2237F}" type="datetime1">
               <a:rPr lang="de-DE" smtClean="0"/>
-              <a:t>21.10.2018</a:t>
+              <a:t>30.10.2018</a:t>
             </a:fld>
             <a:endParaRPr lang="de-DE"/>
           </a:p>
@@ -2555,7 +2561,7 @@
           <a:p>
             <a:fld id="{48352B5A-167D-4ED6-B7C9-BDA647A8BA51}" type="datetime1">
               <a:rPr lang="de-DE" smtClean="0"/>
-              <a:t>21.10.2018</a:t>
+              <a:t>30.10.2018</a:t>
             </a:fld>
             <a:endParaRPr lang="de-DE"/>
           </a:p>
@@ -2745,7 +2751,7 @@
           <a:p>
             <a:fld id="{F782B8C6-A2A3-4B66-A839-DF7B16517350}" type="datetime1">
               <a:rPr lang="de-DE" smtClean="0"/>
-              <a:t>21.10.2018</a:t>
+              <a:t>30.10.2018</a:t>
             </a:fld>
             <a:endParaRPr lang="de-DE"/>
           </a:p>
@@ -3136,7 +3142,7 @@
           <a:p>
             <a:fld id="{649D13A7-6296-4A54-8C64-66A02EB71342}" type="datetime1">
               <a:rPr lang="de-DE" smtClean="0"/>
-              <a:t>21.10.2018</a:t>
+              <a:t>30.10.2018</a:t>
             </a:fld>
             <a:endParaRPr lang="de-DE"/>
           </a:p>
@@ -3675,7 +3681,7 @@
           <a:p>
             <a:fld id="{ED7E8129-6AB0-4316-89DD-05AD9ABD1F9D}" type="datetime1">
               <a:rPr lang="de-DE" smtClean="0"/>
-              <a:t>21.10.2018</a:t>
+              <a:t>30.10.2018</a:t>
             </a:fld>
             <a:endParaRPr lang="de-DE"/>
           </a:p>
@@ -3792,7 +3798,7 @@
           <a:p>
             <a:fld id="{4FD0AE75-8AA0-449D-989F-B1E818A5B67A}" type="datetime1">
               <a:rPr lang="de-DE" smtClean="0"/>
-              <a:t>21.10.2018</a:t>
+              <a:t>30.10.2018</a:t>
             </a:fld>
             <a:endParaRPr lang="de-DE"/>
           </a:p>
@@ -3887,7 +3893,7 @@
           <a:p>
             <a:fld id="{455D07A7-0ED1-4138-9FBD-0F4825E4365D}" type="datetime1">
               <a:rPr lang="de-DE" smtClean="0"/>
-              <a:t>21.10.2018</a:t>
+              <a:t>30.10.2018</a:t>
             </a:fld>
             <a:endParaRPr lang="de-DE"/>
           </a:p>
@@ -3982,7 +3988,7 @@
           <a:p>
             <a:fld id="{6A743ADA-15EC-46F2-B124-7B3EABB341FC}" type="datetime1">
               <a:rPr lang="de-DE" smtClean="0"/>
-              <a:t>21.10.2018</a:t>
+              <a:t>30.10.2018</a:t>
             </a:fld>
             <a:endParaRPr lang="de-DE"/>
           </a:p>
@@ -4401,7 +4407,7 @@
           <a:p>
             <a:fld id="{34F16289-DF57-4F0A-9158-80987495B444}" type="datetime1">
               <a:rPr lang="de-DE" smtClean="0"/>
-              <a:t>21.10.2018</a:t>
+              <a:t>30.10.2018</a:t>
             </a:fld>
             <a:endParaRPr lang="de-DE"/>
           </a:p>
@@ -4637,7 +4643,7 @@
           <a:p>
             <a:fld id="{30694A65-3AA1-42B9-B750-09273D0D99B8}" type="datetime1">
               <a:rPr lang="de-DE" smtClean="0"/>
-              <a:t>21.10.2018</a:t>
+              <a:t>30.10.2018</a:t>
             </a:fld>
             <a:endParaRPr lang="de-DE"/>
           </a:p>
@@ -5574,7 +5580,7 @@
           <a:p>
             <a:fld id="{48352B5A-167D-4ED6-B7C9-BDA647A8BA51}" type="datetime1">
               <a:rPr lang="de-DE" smtClean="0"/>
-              <a:t>21.10.2018</a:t>
+              <a:t>30.10.2018</a:t>
             </a:fld>
             <a:endParaRPr lang="de-DE"/>
           </a:p>
@@ -5829,7 +5835,7 @@
           <a:p>
             <a:fld id="{48352B5A-167D-4ED6-B7C9-BDA647A8BA51}" type="datetime1">
               <a:rPr lang="de-DE" smtClean="0"/>
-              <a:t>21.10.2018</a:t>
+              <a:t>30.10.2018</a:t>
             </a:fld>
             <a:endParaRPr lang="de-DE"/>
           </a:p>
@@ -6078,7 +6084,7 @@
           <a:p>
             <a:fld id="{48352B5A-167D-4ED6-B7C9-BDA647A8BA51}" type="datetime1">
               <a:rPr lang="de-DE" smtClean="0"/>
-              <a:t>21.10.2018</a:t>
+              <a:t>30.10.2018</a:t>
             </a:fld>
             <a:endParaRPr lang="de-DE"/>
           </a:p>
@@ -6575,7 +6581,7 @@
           <a:p>
             <a:fld id="{48352B5A-167D-4ED6-B7C9-BDA647A8BA51}" type="datetime1">
               <a:rPr lang="de-DE" smtClean="0"/>
-              <a:t>21.10.2018</a:t>
+              <a:t>30.10.2018</a:t>
             </a:fld>
             <a:endParaRPr lang="de-DE"/>
           </a:p>
@@ -7055,7 +7061,7 @@
           <a:p>
             <a:fld id="{48352B5A-167D-4ED6-B7C9-BDA647A8BA51}" type="datetime1">
               <a:rPr lang="de-DE" smtClean="0"/>
-              <a:t>21.10.2018</a:t>
+              <a:t>30.10.2018</a:t>
             </a:fld>
             <a:endParaRPr lang="de-DE"/>
           </a:p>
@@ -7357,7 +7363,7 @@
           <a:p>
             <a:fld id="{48352B5A-167D-4ED6-B7C9-BDA647A8BA51}" type="datetime1">
               <a:rPr lang="de-DE" smtClean="0"/>
-              <a:t>21.10.2018</a:t>
+              <a:t>30.10.2018</a:t>
             </a:fld>
             <a:endParaRPr lang="de-DE"/>
           </a:p>
@@ -7633,7 +7639,7 @@
           <a:p>
             <a:fld id="{48352B5A-167D-4ED6-B7C9-BDA647A8BA51}" type="datetime1">
               <a:rPr lang="de-DE" smtClean="0"/>
-              <a:t>21.10.2018</a:t>
+              <a:t>30.10.2018</a:t>
             </a:fld>
             <a:endParaRPr lang="de-DE"/>
           </a:p>
@@ -7854,7 +7860,7 @@
           <a:p>
             <a:fld id="{48352B5A-167D-4ED6-B7C9-BDA647A8BA51}" type="datetime1">
               <a:rPr lang="de-DE" smtClean="0"/>
-              <a:t>21.10.2018</a:t>
+              <a:t>30.10.2018</a:t>
             </a:fld>
             <a:endParaRPr lang="de-DE"/>
           </a:p>
@@ -8082,7 +8088,7 @@
           <a:p>
             <a:fld id="{48352B5A-167D-4ED6-B7C9-BDA647A8BA51}" type="datetime1">
               <a:rPr lang="de-DE" smtClean="0"/>
-              <a:t>21.10.2018</a:t>
+              <a:t>30.10.2018</a:t>
             </a:fld>
             <a:endParaRPr lang="de-DE"/>
           </a:p>
@@ -8358,7 +8364,7 @@
           <a:p>
             <a:fld id="{48352B5A-167D-4ED6-B7C9-BDA647A8BA51}" type="datetime1">
               <a:rPr lang="de-DE" smtClean="0"/>
-              <a:t>21.10.2018</a:t>
+              <a:t>30.10.2018</a:t>
             </a:fld>
             <a:endParaRPr lang="de-DE"/>
           </a:p>
@@ -8545,7 +8551,7 @@
           <a:p>
             <a:fld id="{48352B5A-167D-4ED6-B7C9-BDA647A8BA51}" type="datetime1">
               <a:rPr lang="de-DE" smtClean="0"/>
-              <a:t>21.10.2018</a:t>
+              <a:t>30.10.2018</a:t>
             </a:fld>
             <a:endParaRPr lang="de-DE"/>
           </a:p>
@@ -8802,7 +8808,7 @@
           <a:p>
             <a:fld id="{48352B5A-167D-4ED6-B7C9-BDA647A8BA51}" type="datetime1">
               <a:rPr lang="de-DE" smtClean="0"/>
-              <a:t>21.10.2018</a:t>
+              <a:t>30.10.2018</a:t>
             </a:fld>
             <a:endParaRPr lang="de-DE"/>
           </a:p>
@@ -9051,7 +9057,7 @@
           <a:p>
             <a:fld id="{48352B5A-167D-4ED6-B7C9-BDA647A8BA51}" type="datetime1">
               <a:rPr lang="de-DE" smtClean="0"/>
-              <a:t>21.10.2018</a:t>
+              <a:t>30.10.2018</a:t>
             </a:fld>
             <a:endParaRPr lang="de-DE"/>
           </a:p>
@@ -9404,7 +9410,7 @@
           <a:p>
             <a:fld id="{48352B5A-167D-4ED6-B7C9-BDA647A8BA51}" type="datetime1">
               <a:rPr lang="de-DE" smtClean="0"/>
-              <a:t>21.10.2018</a:t>
+              <a:t>30.10.2018</a:t>
             </a:fld>
             <a:endParaRPr lang="de-DE"/>
           </a:p>
@@ -9652,7 +9658,7 @@
           <a:p>
             <a:fld id="{48352B5A-167D-4ED6-B7C9-BDA647A8BA51}" type="datetime1">
               <a:rPr lang="de-DE" smtClean="0"/>
-              <a:t>21.10.2018</a:t>
+              <a:t>30.10.2018</a:t>
             </a:fld>
             <a:endParaRPr lang="de-DE"/>
           </a:p>
@@ -9865,7 +9871,7 @@
           <a:p>
             <a:fld id="{48352B5A-167D-4ED6-B7C9-BDA647A8BA51}" type="datetime1">
               <a:rPr lang="de-DE" smtClean="0"/>
-              <a:t>21.10.2018</a:t>
+              <a:t>30.10.2018</a:t>
             </a:fld>
             <a:endParaRPr lang="de-DE"/>
           </a:p>
@@ -10132,7 +10138,7 @@
           <a:p>
             <a:fld id="{48352B5A-167D-4ED6-B7C9-BDA647A8BA51}" type="datetime1">
               <a:rPr lang="de-DE" smtClean="0"/>
-              <a:t>21.10.2018</a:t>
+              <a:t>30.10.2018</a:t>
             </a:fld>
             <a:endParaRPr lang="de-DE"/>
           </a:p>
@@ -10703,7 +10709,7 @@
           <a:p>
             <a:fld id="{48352B5A-167D-4ED6-B7C9-BDA647A8BA51}" type="datetime1">
               <a:rPr lang="de-DE" smtClean="0"/>
-              <a:t>21.10.2018</a:t>
+              <a:t>30.10.2018</a:t>
             </a:fld>
             <a:endParaRPr lang="de-DE"/>
           </a:p>
@@ -10966,7 +10972,7 @@
           <a:p>
             <a:fld id="{48352B5A-167D-4ED6-B7C9-BDA647A8BA51}" type="datetime1">
               <a:rPr lang="de-DE" smtClean="0"/>
-              <a:t>21.10.2018</a:t>
+              <a:t>30.10.2018</a:t>
             </a:fld>
             <a:endParaRPr lang="de-DE"/>
           </a:p>
@@ -11167,7 +11173,7 @@
           <a:p>
             <a:fld id="{48352B5A-167D-4ED6-B7C9-BDA647A8BA51}" type="datetime1">
               <a:rPr lang="de-DE" smtClean="0"/>
-              <a:t>21.10.2018</a:t>
+              <a:t>30.10.2018</a:t>
             </a:fld>
             <a:endParaRPr lang="de-DE"/>
           </a:p>
@@ -11396,7 +11402,7 @@
           <a:p>
             <a:fld id="{48352B5A-167D-4ED6-B7C9-BDA647A8BA51}" type="datetime1">
               <a:rPr lang="de-DE" smtClean="0"/>
-              <a:t>21.10.2018</a:t>
+              <a:t>30.10.2018</a:t>
             </a:fld>
             <a:endParaRPr lang="de-DE"/>
           </a:p>
@@ -11628,7 +11634,7 @@
           <a:p>
             <a:fld id="{48352B5A-167D-4ED6-B7C9-BDA647A8BA51}" type="datetime1">
               <a:rPr lang="de-DE" smtClean="0"/>
-              <a:t>21.10.2018</a:t>
+              <a:t>30.10.2018</a:t>
             </a:fld>
             <a:endParaRPr lang="de-DE"/>
           </a:p>
@@ -11887,7 +11893,7 @@
           <a:p>
             <a:fld id="{48352B5A-167D-4ED6-B7C9-BDA647A8BA51}" type="datetime1">
               <a:rPr lang="de-DE" smtClean="0"/>
-              <a:t>21.10.2018</a:t>
+              <a:t>30.10.2018</a:t>
             </a:fld>
             <a:endParaRPr lang="de-DE"/>
           </a:p>
@@ -12152,7 +12158,7 @@
           <a:p>
             <a:fld id="{48352B5A-167D-4ED6-B7C9-BDA647A8BA51}" type="datetime1">
               <a:rPr lang="de-DE" smtClean="0"/>
-              <a:t>21.10.2018</a:t>
+              <a:t>30.10.2018</a:t>
             </a:fld>
             <a:endParaRPr lang="de-DE"/>
           </a:p>
@@ -12378,7 +12384,7 @@
           <a:p>
             <a:fld id="{48352B5A-167D-4ED6-B7C9-BDA647A8BA51}" type="datetime1">
               <a:rPr lang="de-DE" smtClean="0"/>
-              <a:t>21.10.2018</a:t>
+              <a:t>30.10.2018</a:t>
             </a:fld>
             <a:endParaRPr lang="de-DE"/>
           </a:p>
@@ -12627,7 +12633,7 @@
           <a:p>
             <a:fld id="{48352B5A-167D-4ED6-B7C9-BDA647A8BA51}" type="datetime1">
               <a:rPr lang="de-DE" smtClean="0"/>
-              <a:t>21.10.2018</a:t>
+              <a:t>30.10.2018</a:t>
             </a:fld>
             <a:endParaRPr lang="de-DE"/>
           </a:p>
@@ -12930,7 +12936,7 @@
           <a:p>
             <a:fld id="{48352B5A-167D-4ED6-B7C9-BDA647A8BA51}" type="datetime1">
               <a:rPr lang="de-DE" smtClean="0"/>
-              <a:t>21.10.2018</a:t>
+              <a:t>30.10.2018</a:t>
             </a:fld>
             <a:endParaRPr lang="de-DE"/>
           </a:p>
@@ -13577,7 +13583,7 @@
           <a:p>
             <a:fld id="{48352B5A-167D-4ED6-B7C9-BDA647A8BA51}" type="datetime1">
               <a:rPr lang="de-DE" smtClean="0"/>
-              <a:t>21.10.2018</a:t>
+              <a:t>30.10.2018</a:t>
             </a:fld>
             <a:endParaRPr lang="de-DE"/>
           </a:p>
@@ -13772,7 +13778,7 @@
           <p:cNvPr id="2" name="Titel 1">
             <a:extLst>
               <a:ext uri="{FF2B5EF4-FFF2-40B4-BE49-F238E27FC236}">
-                <a16:creationId xmlns:a16="http://schemas.microsoft.com/office/drawing/2014/main" id="{FB3D4AA2-6BD9-4FAA-BD20-ACECFEE17743}"/>
+                <a16:creationId xmlns:a16="http://schemas.microsoft.com/office/drawing/2014/main" id="{13093AFF-9982-4D9C-9691-6A5C95B724A4}"/>
               </a:ext>
             </a:extLst>
           </p:cNvPr>
@@ -13789,10 +13795,9 @@
           <a:lstStyle/>
           <a:p>
             <a:r>
-              <a:rPr lang="de-CH" dirty="0" err="1"/>
-              <a:t>RxJS</a:t>
-            </a:r>
-            <a:endParaRPr lang="de-CH" dirty="0"/>
+              <a:rPr lang="de-CH" dirty="0"/>
+              <a:t>Was ist noch zu tun</a:t>
+            </a:r>
           </a:p>
         </p:txBody>
       </p:sp>
@@ -13801,7 +13806,7 @@
           <p:cNvPr id="3" name="Datumsplatzhalter 2">
             <a:extLst>
               <a:ext uri="{FF2B5EF4-FFF2-40B4-BE49-F238E27FC236}">
-                <a16:creationId xmlns:a16="http://schemas.microsoft.com/office/drawing/2014/main" id="{ADE5015B-EB6F-4AE0-9B1D-F5BAD3EA3B7F}"/>
+                <a16:creationId xmlns:a16="http://schemas.microsoft.com/office/drawing/2014/main" id="{05E33F24-E000-4573-8CB2-9728D363B7A7}"/>
               </a:ext>
             </a:extLst>
           </p:cNvPr>
@@ -13819,7 +13824,7 @@
           <a:p>
             <a:fld id="{48352B5A-167D-4ED6-B7C9-BDA647A8BA51}" type="datetime1">
               <a:rPr lang="de-DE" smtClean="0"/>
-              <a:t>21.10.2018</a:t>
+              <a:t>30.10.2018</a:t>
             </a:fld>
             <a:endParaRPr lang="de-DE"/>
           </a:p>
@@ -13830,7 +13835,7 @@
           <p:cNvPr id="4" name="Fußzeilenplatzhalter 3">
             <a:extLst>
               <a:ext uri="{FF2B5EF4-FFF2-40B4-BE49-F238E27FC236}">
-                <a16:creationId xmlns:a16="http://schemas.microsoft.com/office/drawing/2014/main" id="{CCF7C28A-F2DB-4863-8F13-4477C4B7C84C}"/>
+                <a16:creationId xmlns:a16="http://schemas.microsoft.com/office/drawing/2014/main" id="{000A925A-FD0A-4D78-AC6A-542A4745A732}"/>
               </a:ext>
             </a:extLst>
           </p:cNvPr>
@@ -13859,7 +13864,7 @@
           <p:cNvPr id="5" name="Foliennummernplatzhalter 4">
             <a:extLst>
               <a:ext uri="{FF2B5EF4-FFF2-40B4-BE49-F238E27FC236}">
-                <a16:creationId xmlns:a16="http://schemas.microsoft.com/office/drawing/2014/main" id="{1097CC81-6880-47A7-9EE7-930694B470BE}"/>
+                <a16:creationId xmlns:a16="http://schemas.microsoft.com/office/drawing/2014/main" id="{FA2E024D-F892-4351-926C-DB54CEF5947F}"/>
               </a:ext>
             </a:extLst>
           </p:cNvPr>
@@ -13888,7 +13893,7 @@
           <p:cNvPr id="6" name="Inhaltsplatzhalter 5">
             <a:extLst>
               <a:ext uri="{FF2B5EF4-FFF2-40B4-BE49-F238E27FC236}">
-                <a16:creationId xmlns:a16="http://schemas.microsoft.com/office/drawing/2014/main" id="{DA96064B-0E5B-432E-B9AF-DED514BD1E9F}"/>
+                <a16:creationId xmlns:a16="http://schemas.microsoft.com/office/drawing/2014/main" id="{8E1140B5-A34B-4D01-ABD5-596BE1B079E2}"/>
               </a:ext>
             </a:extLst>
           </p:cNvPr>
@@ -13904,14 +13909,744 @@
           <a:bodyPr/>
           <a:lstStyle/>
           <a:p>
+            <a:r>
+              <a:rPr lang="de-CH" dirty="0"/>
+              <a:t>Die Applikation sieht nun schön aus und funktioniert.</a:t>
+            </a:r>
+          </a:p>
+          <a:p>
+            <a:r>
+              <a:rPr lang="de-CH" dirty="0"/>
+              <a:t>Was müssen wir jetzt noch machen?</a:t>
+            </a:r>
+          </a:p>
+        </p:txBody>
+      </p:sp>
+    </p:spTree>
+    <p:extLst>
+      <p:ext uri="{BB962C8B-B14F-4D97-AF65-F5344CB8AC3E}">
+        <p14:creationId xmlns:p14="http://schemas.microsoft.com/office/powerpoint/2010/main" val="1658791512"/>
+      </p:ext>
+    </p:extLst>
+  </p:cSld>
+  <p:clrMapOvr>
+    <a:masterClrMapping/>
+  </p:clrMapOvr>
+</p:sld>
+</file>
+
+<file path=ppt/slides/slide37.xml><?xml version="1.0" encoding="utf-8"?>
+<p:sld xmlns:a="http://schemas.openxmlformats.org/drawingml/2006/main" xmlns:r="http://schemas.openxmlformats.org/officeDocument/2006/relationships" xmlns:p="http://schemas.openxmlformats.org/presentationml/2006/main">
+  <p:cSld>
+    <p:spTree>
+      <p:nvGrpSpPr>
+        <p:cNvPr id="1" name=""/>
+        <p:cNvGrpSpPr/>
+        <p:nvPr/>
+      </p:nvGrpSpPr>
+      <p:grpSpPr>
+        <a:xfrm>
+          <a:off x="0" y="0"/>
+          <a:ext cx="0" cy="0"/>
+          <a:chOff x="0" y="0"/>
+          <a:chExt cx="0" cy="0"/>
+        </a:xfrm>
+      </p:grpSpPr>
+      <p:sp>
+        <p:nvSpPr>
+          <p:cNvPr id="2" name="Titel 1">
+            <a:extLst>
+              <a:ext uri="{FF2B5EF4-FFF2-40B4-BE49-F238E27FC236}">
+                <a16:creationId xmlns:a16="http://schemas.microsoft.com/office/drawing/2014/main" id="{FB3D4AA2-6BD9-4FAA-BD20-ACECFEE17743}"/>
+              </a:ext>
+            </a:extLst>
+          </p:cNvPr>
+          <p:cNvSpPr>
+            <a:spLocks noGrp="1"/>
+          </p:cNvSpPr>
+          <p:nvPr>
+            <p:ph type="title"/>
+          </p:nvPr>
+        </p:nvSpPr>
+        <p:spPr/>
+        <p:txBody>
+          <a:bodyPr/>
+          <a:lstStyle/>
+          <a:p>
+            <a:r>
+              <a:rPr lang="de-CH" dirty="0" err="1"/>
+              <a:t>RxJS</a:t>
+            </a:r>
             <a:endParaRPr lang="de-CH" dirty="0"/>
           </a:p>
         </p:txBody>
       </p:sp>
+      <p:sp>
+        <p:nvSpPr>
+          <p:cNvPr id="3" name="Datumsplatzhalter 2">
+            <a:extLst>
+              <a:ext uri="{FF2B5EF4-FFF2-40B4-BE49-F238E27FC236}">
+                <a16:creationId xmlns:a16="http://schemas.microsoft.com/office/drawing/2014/main" id="{ADE5015B-EB6F-4AE0-9B1D-F5BAD3EA3B7F}"/>
+              </a:ext>
+            </a:extLst>
+          </p:cNvPr>
+          <p:cNvSpPr>
+            <a:spLocks noGrp="1"/>
+          </p:cNvSpPr>
+          <p:nvPr>
+            <p:ph type="dt" sz="half" idx="10"/>
+          </p:nvPr>
+        </p:nvSpPr>
+        <p:spPr/>
+        <p:txBody>
+          <a:bodyPr/>
+          <a:lstStyle/>
+          <a:p>
+            <a:fld id="{48352B5A-167D-4ED6-B7C9-BDA647A8BA51}" type="datetime1">
+              <a:rPr lang="de-DE" smtClean="0"/>
+              <a:t>30.10.2018</a:t>
+            </a:fld>
+            <a:endParaRPr lang="de-DE"/>
+          </a:p>
+        </p:txBody>
+      </p:sp>
+      <p:sp>
+        <p:nvSpPr>
+          <p:cNvPr id="4" name="Fußzeilenplatzhalter 3">
+            <a:extLst>
+              <a:ext uri="{FF2B5EF4-FFF2-40B4-BE49-F238E27FC236}">
+                <a16:creationId xmlns:a16="http://schemas.microsoft.com/office/drawing/2014/main" id="{CCF7C28A-F2DB-4863-8F13-4477C4B7C84C}"/>
+              </a:ext>
+            </a:extLst>
+          </p:cNvPr>
+          <p:cNvSpPr>
+            <a:spLocks noGrp="1"/>
+          </p:cNvSpPr>
+          <p:nvPr>
+            <p:ph type="ftr" sz="quarter" idx="11"/>
+          </p:nvPr>
+        </p:nvSpPr>
+        <p:spPr/>
+        <p:txBody>
+          <a:bodyPr/>
+          <a:lstStyle/>
+          <a:p>
+            <a:r>
+              <a:rPr lang="de-DE"/>
+              <a:t>React, Materialize, RxJS</a:t>
+            </a:r>
+            <a:endParaRPr lang="de-DE" dirty="0"/>
+          </a:p>
+        </p:txBody>
+      </p:sp>
+      <p:sp>
+        <p:nvSpPr>
+          <p:cNvPr id="5" name="Foliennummernplatzhalter 4">
+            <a:extLst>
+              <a:ext uri="{FF2B5EF4-FFF2-40B4-BE49-F238E27FC236}">
+                <a16:creationId xmlns:a16="http://schemas.microsoft.com/office/drawing/2014/main" id="{1097CC81-6880-47A7-9EE7-930694B470BE}"/>
+              </a:ext>
+            </a:extLst>
+          </p:cNvPr>
+          <p:cNvSpPr>
+            <a:spLocks noGrp="1"/>
+          </p:cNvSpPr>
+          <p:nvPr>
+            <p:ph type="sldNum" sz="quarter" idx="12"/>
+          </p:nvPr>
+        </p:nvSpPr>
+        <p:spPr/>
+        <p:txBody>
+          <a:bodyPr/>
+          <a:lstStyle/>
+          <a:p>
+            <a:fld id="{E07F1749-2C29-4AD9-BF92-E70F8884412B}" type="slidenum">
+              <a:rPr lang="de-DE" smtClean="0"/>
+              <a:t>37</a:t>
+            </a:fld>
+            <a:endParaRPr lang="de-DE"/>
+          </a:p>
+        </p:txBody>
+      </p:sp>
+      <p:pic>
+        <p:nvPicPr>
+          <p:cNvPr id="10" name="Picture 10" descr="Bildergebnis fÃ¼r rxjs">
+            <a:extLst>
+              <a:ext uri="{FF2B5EF4-FFF2-40B4-BE49-F238E27FC236}">
+                <a16:creationId xmlns:a16="http://schemas.microsoft.com/office/drawing/2014/main" id="{9D988982-CD7A-4A00-A911-4E9132A2F7C0}"/>
+              </a:ext>
+            </a:extLst>
+          </p:cNvPr>
+          <p:cNvPicPr>
+            <a:picLocks noGrp="1" noChangeAspect="1" noChangeArrowheads="1"/>
+          </p:cNvPicPr>
+          <p:nvPr>
+            <p:ph sz="quarter" idx="13"/>
+          </p:nvPr>
+        </p:nvPicPr>
+        <p:blipFill>
+          <a:blip r:embed="rId2">
+            <a:extLst>
+              <a:ext uri="{28A0092B-C50C-407E-A947-70E740481C1C}">
+                <a14:useLocalDpi xmlns:a14="http://schemas.microsoft.com/office/drawing/2010/main" val="0"/>
+              </a:ext>
+            </a:extLst>
+          </a:blip>
+          <a:srcRect/>
+          <a:stretch>
+            <a:fillRect/>
+          </a:stretch>
+        </p:blipFill>
+        <p:spPr bwMode="auto">
+          <a:xfrm>
+            <a:off x="3774992" y="2226385"/>
+            <a:ext cx="3251367" cy="3251367"/>
+          </a:xfrm>
+          <a:prstGeom prst="rect">
+            <a:avLst/>
+          </a:prstGeom>
+          <a:noFill/>
+          <a:extLst>
+            <a:ext uri="{909E8E84-426E-40DD-AFC4-6F175D3DCCD1}">
+              <a14:hiddenFill xmlns:a14="http://schemas.microsoft.com/office/drawing/2010/main">
+                <a:solidFill>
+                  <a:srgbClr val="FFFFFF"/>
+                </a:solidFill>
+              </a14:hiddenFill>
+            </a:ext>
+          </a:extLst>
+        </p:spPr>
+      </p:pic>
     </p:spTree>
     <p:extLst>
       <p:ext uri="{BB962C8B-B14F-4D97-AF65-F5344CB8AC3E}">
         <p14:creationId xmlns:p14="http://schemas.microsoft.com/office/powerpoint/2010/main" val="1628031244"/>
+      </p:ext>
+    </p:extLst>
+  </p:cSld>
+  <p:clrMapOvr>
+    <a:masterClrMapping/>
+  </p:clrMapOvr>
+</p:sld>
+</file>
+
+<file path=ppt/slides/slide38.xml><?xml version="1.0" encoding="utf-8"?>
+<p:sld xmlns:a="http://schemas.openxmlformats.org/drawingml/2006/main" xmlns:r="http://schemas.openxmlformats.org/officeDocument/2006/relationships" xmlns:p="http://schemas.openxmlformats.org/presentationml/2006/main">
+  <p:cSld>
+    <p:spTree>
+      <p:nvGrpSpPr>
+        <p:cNvPr id="1" name=""/>
+        <p:cNvGrpSpPr/>
+        <p:nvPr/>
+      </p:nvGrpSpPr>
+      <p:grpSpPr>
+        <a:xfrm>
+          <a:off x="0" y="0"/>
+          <a:ext cx="0" cy="0"/>
+          <a:chOff x="0" y="0"/>
+          <a:chExt cx="0" cy="0"/>
+        </a:xfrm>
+      </p:grpSpPr>
+      <p:sp>
+        <p:nvSpPr>
+          <p:cNvPr id="2" name="Titel 1">
+            <a:extLst>
+              <a:ext uri="{FF2B5EF4-FFF2-40B4-BE49-F238E27FC236}">
+                <a16:creationId xmlns:a16="http://schemas.microsoft.com/office/drawing/2014/main" id="{1EC1F6A3-D60E-48E5-9AA4-4E872481BC05}"/>
+              </a:ext>
+            </a:extLst>
+          </p:cNvPr>
+          <p:cNvSpPr>
+            <a:spLocks noGrp="1"/>
+          </p:cNvSpPr>
+          <p:nvPr>
+            <p:ph type="title"/>
+          </p:nvPr>
+        </p:nvSpPr>
+        <p:spPr/>
+        <p:txBody>
+          <a:bodyPr/>
+          <a:lstStyle/>
+          <a:p>
+            <a:r>
+              <a:rPr lang="de-CH" dirty="0"/>
+              <a:t>Links</a:t>
+            </a:r>
+          </a:p>
+        </p:txBody>
+      </p:sp>
+      <p:sp>
+        <p:nvSpPr>
+          <p:cNvPr id="3" name="Datumsplatzhalter 2">
+            <a:extLst>
+              <a:ext uri="{FF2B5EF4-FFF2-40B4-BE49-F238E27FC236}">
+                <a16:creationId xmlns:a16="http://schemas.microsoft.com/office/drawing/2014/main" id="{3DFFD4F3-1638-466E-AACB-ABDE62105A15}"/>
+              </a:ext>
+            </a:extLst>
+          </p:cNvPr>
+          <p:cNvSpPr>
+            <a:spLocks noGrp="1"/>
+          </p:cNvSpPr>
+          <p:nvPr>
+            <p:ph type="dt" sz="half" idx="10"/>
+          </p:nvPr>
+        </p:nvSpPr>
+        <p:spPr/>
+        <p:txBody>
+          <a:bodyPr/>
+          <a:lstStyle/>
+          <a:p>
+            <a:fld id="{48352B5A-167D-4ED6-B7C9-BDA647A8BA51}" type="datetime1">
+              <a:rPr lang="de-DE" smtClean="0"/>
+              <a:t>30.10.2018</a:t>
+            </a:fld>
+            <a:endParaRPr lang="de-DE"/>
+          </a:p>
+        </p:txBody>
+      </p:sp>
+      <p:sp>
+        <p:nvSpPr>
+          <p:cNvPr id="4" name="Fußzeilenplatzhalter 3">
+            <a:extLst>
+              <a:ext uri="{FF2B5EF4-FFF2-40B4-BE49-F238E27FC236}">
+                <a16:creationId xmlns:a16="http://schemas.microsoft.com/office/drawing/2014/main" id="{9AB1FFA2-EA78-4D6E-9262-7A4B584827ED}"/>
+              </a:ext>
+            </a:extLst>
+          </p:cNvPr>
+          <p:cNvSpPr>
+            <a:spLocks noGrp="1"/>
+          </p:cNvSpPr>
+          <p:nvPr>
+            <p:ph type="ftr" sz="quarter" idx="11"/>
+          </p:nvPr>
+        </p:nvSpPr>
+        <p:spPr/>
+        <p:txBody>
+          <a:bodyPr/>
+          <a:lstStyle/>
+          <a:p>
+            <a:r>
+              <a:rPr lang="de-DE"/>
+              <a:t>React, Materialize, RxJS</a:t>
+            </a:r>
+            <a:endParaRPr lang="de-DE" dirty="0"/>
+          </a:p>
+        </p:txBody>
+      </p:sp>
+      <p:sp>
+        <p:nvSpPr>
+          <p:cNvPr id="5" name="Foliennummernplatzhalter 4">
+            <a:extLst>
+              <a:ext uri="{FF2B5EF4-FFF2-40B4-BE49-F238E27FC236}">
+                <a16:creationId xmlns:a16="http://schemas.microsoft.com/office/drawing/2014/main" id="{28EF831B-FEE4-49A2-B7D8-22E4A667F8B7}"/>
+              </a:ext>
+            </a:extLst>
+          </p:cNvPr>
+          <p:cNvSpPr>
+            <a:spLocks noGrp="1"/>
+          </p:cNvSpPr>
+          <p:nvPr>
+            <p:ph type="sldNum" sz="quarter" idx="12"/>
+          </p:nvPr>
+        </p:nvSpPr>
+        <p:spPr/>
+        <p:txBody>
+          <a:bodyPr/>
+          <a:lstStyle/>
+          <a:p>
+            <a:fld id="{E07F1749-2C29-4AD9-BF92-E70F8884412B}" type="slidenum">
+              <a:rPr lang="de-DE" smtClean="0"/>
+              <a:t>38</a:t>
+            </a:fld>
+            <a:endParaRPr lang="de-DE"/>
+          </a:p>
+        </p:txBody>
+      </p:sp>
+      <p:sp>
+        <p:nvSpPr>
+          <p:cNvPr id="6" name="Inhaltsplatzhalter 5">
+            <a:extLst>
+              <a:ext uri="{FF2B5EF4-FFF2-40B4-BE49-F238E27FC236}">
+                <a16:creationId xmlns:a16="http://schemas.microsoft.com/office/drawing/2014/main" id="{48BC2F46-4D0A-48ED-8F41-F0736182EC8F}"/>
+              </a:ext>
+            </a:extLst>
+          </p:cNvPr>
+          <p:cNvSpPr>
+            <a:spLocks noGrp="1"/>
+          </p:cNvSpPr>
+          <p:nvPr>
+            <p:ph sz="quarter" idx="13"/>
+          </p:nvPr>
+        </p:nvSpPr>
+        <p:spPr/>
+        <p:txBody>
+          <a:bodyPr/>
+          <a:lstStyle/>
+          <a:p>
+            <a:r>
+              <a:rPr lang="de-CH" dirty="0"/>
+              <a:t>Homepage:			https://rxjs-dev.firebaseapp.com/</a:t>
+            </a:r>
+          </a:p>
+          <a:p>
+            <a:r>
+              <a:rPr lang="de-CH" dirty="0"/>
+              <a:t>Alte Dokumentation:	</a:t>
+            </a:r>
+            <a:r>
+              <a:rPr lang="de-CH" dirty="0">
+                <a:hlinkClick r:id="rId2"/>
+              </a:rPr>
+              <a:t>http://reactivex.io/rxjs/identifiers.html</a:t>
+            </a:r>
+            <a:endParaRPr lang="de-CH" dirty="0"/>
+          </a:p>
+          <a:p>
+            <a:r>
+              <a:rPr lang="de-CH" dirty="0" err="1"/>
+              <a:t>RxFiddle</a:t>
+            </a:r>
+            <a:r>
+              <a:rPr lang="de-CH" dirty="0"/>
+              <a:t>:			</a:t>
+            </a:r>
+            <a:r>
+              <a:rPr lang="de-CH" dirty="0">
+                <a:hlinkClick r:id="rId2"/>
+              </a:rPr>
+              <a:t>http://rxfiddle.net</a:t>
+            </a:r>
+            <a:endParaRPr lang="de-CH" dirty="0"/>
+          </a:p>
+          <a:p>
+            <a:r>
+              <a:rPr lang="de-CH" dirty="0" err="1"/>
+              <a:t>Rx</a:t>
+            </a:r>
+            <a:r>
+              <a:rPr lang="de-CH" dirty="0"/>
+              <a:t> Visualizer:		</a:t>
+            </a:r>
+            <a:r>
+              <a:rPr lang="de-CH" dirty="0">
+                <a:hlinkClick r:id="rId3"/>
+              </a:rPr>
+              <a:t>https://rxviz.com/</a:t>
+            </a:r>
+            <a:endParaRPr lang="de-CH" dirty="0"/>
+          </a:p>
+          <a:p>
+            <a:endParaRPr lang="de-CH" dirty="0"/>
+          </a:p>
+          <a:p>
+            <a:r>
+              <a:rPr lang="de-CH" dirty="0"/>
+              <a:t>Von Version 5 zu 6 gab es wesentliche Änderungen!</a:t>
+            </a:r>
+          </a:p>
+          <a:p>
+            <a:r>
+              <a:rPr lang="de-CH" dirty="0">
+                <a:hlinkClick r:id="rId4"/>
+              </a:rPr>
+              <a:t>https://rxjs-dev.firebaseapp.com/guide/v6/migration</a:t>
+            </a:r>
+            <a:endParaRPr lang="de-CH" dirty="0"/>
+          </a:p>
+          <a:p>
+            <a:endParaRPr lang="de-CH" dirty="0"/>
+          </a:p>
+        </p:txBody>
+      </p:sp>
+    </p:spTree>
+    <p:extLst>
+      <p:ext uri="{BB962C8B-B14F-4D97-AF65-F5344CB8AC3E}">
+        <p14:creationId xmlns:p14="http://schemas.microsoft.com/office/powerpoint/2010/main" val="47557424"/>
+      </p:ext>
+    </p:extLst>
+  </p:cSld>
+  <p:clrMapOvr>
+    <a:masterClrMapping/>
+  </p:clrMapOvr>
+</p:sld>
+</file>
+
+<file path=ppt/slides/slide39.xml><?xml version="1.0" encoding="utf-8"?>
+<p:sld xmlns:a="http://schemas.openxmlformats.org/drawingml/2006/main" xmlns:r="http://schemas.openxmlformats.org/officeDocument/2006/relationships" xmlns:p="http://schemas.openxmlformats.org/presentationml/2006/main">
+  <p:cSld>
+    <p:spTree>
+      <p:nvGrpSpPr>
+        <p:cNvPr id="1" name=""/>
+        <p:cNvGrpSpPr/>
+        <p:nvPr/>
+      </p:nvGrpSpPr>
+      <p:grpSpPr>
+        <a:xfrm>
+          <a:off x="0" y="0"/>
+          <a:ext cx="0" cy="0"/>
+          <a:chOff x="0" y="0"/>
+          <a:chExt cx="0" cy="0"/>
+        </a:xfrm>
+      </p:grpSpPr>
+      <p:sp>
+        <p:nvSpPr>
+          <p:cNvPr id="2" name="Titel 1">
+            <a:extLst>
+              <a:ext uri="{FF2B5EF4-FFF2-40B4-BE49-F238E27FC236}">
+                <a16:creationId xmlns:a16="http://schemas.microsoft.com/office/drawing/2014/main" id="{5493C864-B4B9-4F72-A5D1-F65D4A81C2B0}"/>
+              </a:ext>
+            </a:extLst>
+          </p:cNvPr>
+          <p:cNvSpPr>
+            <a:spLocks noGrp="1"/>
+          </p:cNvSpPr>
+          <p:nvPr>
+            <p:ph type="title"/>
+          </p:nvPr>
+        </p:nvSpPr>
+        <p:spPr/>
+        <p:txBody>
+          <a:bodyPr/>
+          <a:lstStyle/>
+          <a:p>
+            <a:r>
+              <a:rPr lang="de-CH" dirty="0"/>
+              <a:t>Beispiel 1 (</a:t>
+            </a:r>
+            <a:r>
+              <a:rPr lang="de-CH" dirty="0" err="1"/>
+              <a:t>RxFiddle</a:t>
+            </a:r>
+            <a:r>
+              <a:rPr lang="de-CH" dirty="0"/>
+              <a:t>)</a:t>
+            </a:r>
+          </a:p>
+        </p:txBody>
+      </p:sp>
+      <p:sp>
+        <p:nvSpPr>
+          <p:cNvPr id="3" name="Datumsplatzhalter 2">
+            <a:extLst>
+              <a:ext uri="{FF2B5EF4-FFF2-40B4-BE49-F238E27FC236}">
+                <a16:creationId xmlns:a16="http://schemas.microsoft.com/office/drawing/2014/main" id="{E91327A1-5FF2-4162-9433-E4A9AD0AB1D8}"/>
+              </a:ext>
+            </a:extLst>
+          </p:cNvPr>
+          <p:cNvSpPr>
+            <a:spLocks noGrp="1"/>
+          </p:cNvSpPr>
+          <p:nvPr>
+            <p:ph type="dt" sz="half" idx="10"/>
+          </p:nvPr>
+        </p:nvSpPr>
+        <p:spPr/>
+        <p:txBody>
+          <a:bodyPr/>
+          <a:lstStyle/>
+          <a:p>
+            <a:fld id="{48352B5A-167D-4ED6-B7C9-BDA647A8BA51}" type="datetime1">
+              <a:rPr lang="de-DE" smtClean="0"/>
+              <a:t>30.10.2018</a:t>
+            </a:fld>
+            <a:endParaRPr lang="de-DE"/>
+          </a:p>
+        </p:txBody>
+      </p:sp>
+      <p:sp>
+        <p:nvSpPr>
+          <p:cNvPr id="4" name="Fußzeilenplatzhalter 3">
+            <a:extLst>
+              <a:ext uri="{FF2B5EF4-FFF2-40B4-BE49-F238E27FC236}">
+                <a16:creationId xmlns:a16="http://schemas.microsoft.com/office/drawing/2014/main" id="{5D4980EE-C21A-4B7F-BC44-95D7CC9C35E2}"/>
+              </a:ext>
+            </a:extLst>
+          </p:cNvPr>
+          <p:cNvSpPr>
+            <a:spLocks noGrp="1"/>
+          </p:cNvSpPr>
+          <p:nvPr>
+            <p:ph type="ftr" sz="quarter" idx="11"/>
+          </p:nvPr>
+        </p:nvSpPr>
+        <p:spPr/>
+        <p:txBody>
+          <a:bodyPr/>
+          <a:lstStyle/>
+          <a:p>
+            <a:r>
+              <a:rPr lang="de-DE"/>
+              <a:t>React, Materialize, RxJS</a:t>
+            </a:r>
+            <a:endParaRPr lang="de-DE" dirty="0"/>
+          </a:p>
+        </p:txBody>
+      </p:sp>
+      <p:sp>
+        <p:nvSpPr>
+          <p:cNvPr id="5" name="Foliennummernplatzhalter 4">
+            <a:extLst>
+              <a:ext uri="{FF2B5EF4-FFF2-40B4-BE49-F238E27FC236}">
+                <a16:creationId xmlns:a16="http://schemas.microsoft.com/office/drawing/2014/main" id="{43F570F3-D7A2-4F32-9AF2-B0E110754C4A}"/>
+              </a:ext>
+            </a:extLst>
+          </p:cNvPr>
+          <p:cNvSpPr>
+            <a:spLocks noGrp="1"/>
+          </p:cNvSpPr>
+          <p:nvPr>
+            <p:ph type="sldNum" sz="quarter" idx="12"/>
+          </p:nvPr>
+        </p:nvSpPr>
+        <p:spPr/>
+        <p:txBody>
+          <a:bodyPr/>
+          <a:lstStyle/>
+          <a:p>
+            <a:fld id="{E07F1749-2C29-4AD9-BF92-E70F8884412B}" type="slidenum">
+              <a:rPr lang="de-DE" smtClean="0"/>
+              <a:t>39</a:t>
+            </a:fld>
+            <a:endParaRPr lang="de-DE"/>
+          </a:p>
+        </p:txBody>
+      </p:sp>
+      <p:sp>
+        <p:nvSpPr>
+          <p:cNvPr id="6" name="Inhaltsplatzhalter 5">
+            <a:extLst>
+              <a:ext uri="{FF2B5EF4-FFF2-40B4-BE49-F238E27FC236}">
+                <a16:creationId xmlns:a16="http://schemas.microsoft.com/office/drawing/2014/main" id="{E8BBDEE2-A1D6-4ED4-A0D4-9BDA25857ECB}"/>
+              </a:ext>
+            </a:extLst>
+          </p:cNvPr>
+          <p:cNvSpPr>
+            <a:spLocks noGrp="1"/>
+          </p:cNvSpPr>
+          <p:nvPr>
+            <p:ph sz="quarter" idx="13"/>
+          </p:nvPr>
+        </p:nvSpPr>
+        <p:spPr/>
+        <p:txBody>
+          <a:bodyPr/>
+          <a:lstStyle/>
+          <a:p>
+            <a:r>
+              <a:rPr lang="de-CH" dirty="0" err="1"/>
+              <a:t>Rx.Observable.of</a:t>
+            </a:r>
+            <a:r>
+              <a:rPr lang="de-CH" dirty="0"/>
+              <a:t>(1, 2, 3, 4, 5)</a:t>
+            </a:r>
+          </a:p>
+          <a:p>
+            <a:r>
+              <a:rPr lang="de-CH" dirty="0"/>
+              <a:t>  .</a:t>
+            </a:r>
+            <a:r>
+              <a:rPr lang="de-CH" dirty="0" err="1"/>
+              <a:t>filter</a:t>
+            </a:r>
+            <a:r>
+              <a:rPr lang="de-CH" dirty="0"/>
+              <a:t>(x =&gt; x &lt; 5)</a:t>
+            </a:r>
+          </a:p>
+          <a:p>
+            <a:r>
+              <a:rPr lang="de-CH" dirty="0"/>
+              <a:t>  .</a:t>
+            </a:r>
+            <a:r>
+              <a:rPr lang="de-CH" dirty="0" err="1"/>
+              <a:t>map</a:t>
+            </a:r>
+            <a:r>
+              <a:rPr lang="de-CH" dirty="0"/>
+              <a:t>(x =&gt; 2 * x)</a:t>
+            </a:r>
+          </a:p>
+          <a:p>
+            <a:r>
+              <a:rPr lang="de-CH" dirty="0"/>
+              <a:t>  .</a:t>
+            </a:r>
+            <a:r>
+              <a:rPr lang="de-CH" dirty="0" err="1"/>
+              <a:t>pairwise</a:t>
+            </a:r>
+            <a:r>
+              <a:rPr lang="de-CH" dirty="0"/>
+              <a:t>()</a:t>
+            </a:r>
+          </a:p>
+          <a:p>
+            <a:r>
+              <a:rPr lang="de-CH" dirty="0"/>
+              <a:t>  .</a:t>
+            </a:r>
+            <a:r>
+              <a:rPr lang="de-CH" dirty="0" err="1"/>
+              <a:t>map</a:t>
+            </a:r>
+            <a:r>
+              <a:rPr lang="de-CH" dirty="0"/>
+              <a:t>(pair =&gt; pair[0] * pair[1])</a:t>
+            </a:r>
+          </a:p>
+          <a:p>
+            <a:r>
+              <a:rPr lang="de-CH" dirty="0"/>
+              <a:t>  .</a:t>
+            </a:r>
+            <a:r>
+              <a:rPr lang="de-CH" dirty="0" err="1"/>
+              <a:t>reduce</a:t>
+            </a:r>
+            <a:r>
+              <a:rPr lang="de-CH" dirty="0"/>
+              <a:t>((</a:t>
+            </a:r>
+            <a:r>
+              <a:rPr lang="de-CH" dirty="0" err="1"/>
+              <a:t>sum</a:t>
+            </a:r>
+            <a:r>
+              <a:rPr lang="de-CH" dirty="0"/>
+              <a:t>, x) =&gt; </a:t>
+            </a:r>
+            <a:r>
+              <a:rPr lang="de-CH" dirty="0" err="1"/>
+              <a:t>sum</a:t>
+            </a:r>
+            <a:r>
+              <a:rPr lang="de-CH" dirty="0"/>
+              <a:t> + x, 0)</a:t>
+            </a:r>
+          </a:p>
+          <a:p>
+            <a:r>
+              <a:rPr lang="de-CH" dirty="0"/>
+              <a:t>  .</a:t>
+            </a:r>
+            <a:r>
+              <a:rPr lang="de-CH" dirty="0" err="1"/>
+              <a:t>subscribe</a:t>
+            </a:r>
+            <a:r>
+              <a:rPr lang="de-CH" dirty="0"/>
+              <a:t>()</a:t>
+            </a:r>
+          </a:p>
+        </p:txBody>
+      </p:sp>
+    </p:spTree>
+    <p:extLst>
+      <p:ext uri="{BB962C8B-B14F-4D97-AF65-F5344CB8AC3E}">
+        <p14:creationId xmlns:p14="http://schemas.microsoft.com/office/powerpoint/2010/main" val="1018334206"/>
       </p:ext>
     </p:extLst>
   </p:cSld>
@@ -13989,7 +14724,7 @@
           <a:p>
             <a:fld id="{48352B5A-167D-4ED6-B7C9-BDA647A8BA51}" type="datetime1">
               <a:rPr lang="de-DE" smtClean="0"/>
-              <a:t>21.10.2018</a:t>
+              <a:t>30.10.2018</a:t>
             </a:fld>
             <a:endParaRPr lang="de-DE"/>
           </a:p>
@@ -14127,6 +14862,1052 @@
     <p:extLst>
       <p:ext uri="{BB962C8B-B14F-4D97-AF65-F5344CB8AC3E}">
         <p14:creationId xmlns:p14="http://schemas.microsoft.com/office/powerpoint/2010/main" val="2820852127"/>
+      </p:ext>
+    </p:extLst>
+  </p:cSld>
+  <p:clrMapOvr>
+    <a:masterClrMapping/>
+  </p:clrMapOvr>
+</p:sld>
+</file>
+
+<file path=ppt/slides/slide40.xml><?xml version="1.0" encoding="utf-8"?>
+<p:sld xmlns:a="http://schemas.openxmlformats.org/drawingml/2006/main" xmlns:r="http://schemas.openxmlformats.org/officeDocument/2006/relationships" xmlns:p="http://schemas.openxmlformats.org/presentationml/2006/main">
+  <p:cSld>
+    <p:spTree>
+      <p:nvGrpSpPr>
+        <p:cNvPr id="1" name=""/>
+        <p:cNvGrpSpPr/>
+        <p:nvPr/>
+      </p:nvGrpSpPr>
+      <p:grpSpPr>
+        <a:xfrm>
+          <a:off x="0" y="0"/>
+          <a:ext cx="0" cy="0"/>
+          <a:chOff x="0" y="0"/>
+          <a:chExt cx="0" cy="0"/>
+        </a:xfrm>
+      </p:grpSpPr>
+      <p:sp>
+        <p:nvSpPr>
+          <p:cNvPr id="2" name="Titel 1">
+            <a:extLst>
+              <a:ext uri="{FF2B5EF4-FFF2-40B4-BE49-F238E27FC236}">
+                <a16:creationId xmlns:a16="http://schemas.microsoft.com/office/drawing/2014/main" id="{A956DF2D-9DFB-4045-A6BB-F0750051A097}"/>
+              </a:ext>
+            </a:extLst>
+          </p:cNvPr>
+          <p:cNvSpPr>
+            <a:spLocks noGrp="1"/>
+          </p:cNvSpPr>
+          <p:nvPr>
+            <p:ph type="title"/>
+          </p:nvPr>
+        </p:nvSpPr>
+        <p:spPr/>
+        <p:txBody>
+          <a:bodyPr/>
+          <a:lstStyle/>
+          <a:p>
+            <a:r>
+              <a:rPr lang="de-CH" dirty="0"/>
+              <a:t>Übung 8</a:t>
+            </a:r>
+          </a:p>
+        </p:txBody>
+      </p:sp>
+      <p:sp>
+        <p:nvSpPr>
+          <p:cNvPr id="3" name="Datumsplatzhalter 2">
+            <a:extLst>
+              <a:ext uri="{FF2B5EF4-FFF2-40B4-BE49-F238E27FC236}">
+                <a16:creationId xmlns:a16="http://schemas.microsoft.com/office/drawing/2014/main" id="{8291FF45-07B6-4F55-8B9B-5BDE48170F89}"/>
+              </a:ext>
+            </a:extLst>
+          </p:cNvPr>
+          <p:cNvSpPr>
+            <a:spLocks noGrp="1"/>
+          </p:cNvSpPr>
+          <p:nvPr>
+            <p:ph type="dt" sz="half" idx="10"/>
+          </p:nvPr>
+        </p:nvSpPr>
+        <p:spPr/>
+        <p:txBody>
+          <a:bodyPr/>
+          <a:lstStyle/>
+          <a:p>
+            <a:fld id="{48352B5A-167D-4ED6-B7C9-BDA647A8BA51}" type="datetime1">
+              <a:rPr lang="de-DE" smtClean="0"/>
+              <a:t>30.10.2018</a:t>
+            </a:fld>
+            <a:endParaRPr lang="de-DE"/>
+          </a:p>
+        </p:txBody>
+      </p:sp>
+      <p:sp>
+        <p:nvSpPr>
+          <p:cNvPr id="4" name="Fußzeilenplatzhalter 3">
+            <a:extLst>
+              <a:ext uri="{FF2B5EF4-FFF2-40B4-BE49-F238E27FC236}">
+                <a16:creationId xmlns:a16="http://schemas.microsoft.com/office/drawing/2014/main" id="{8619D27E-B93C-4701-9A84-02AA58BDC899}"/>
+              </a:ext>
+            </a:extLst>
+          </p:cNvPr>
+          <p:cNvSpPr>
+            <a:spLocks noGrp="1"/>
+          </p:cNvSpPr>
+          <p:nvPr>
+            <p:ph type="ftr" sz="quarter" idx="11"/>
+          </p:nvPr>
+        </p:nvSpPr>
+        <p:spPr/>
+        <p:txBody>
+          <a:bodyPr/>
+          <a:lstStyle/>
+          <a:p>
+            <a:r>
+              <a:rPr lang="de-DE"/>
+              <a:t>React, Materialize, RxJS</a:t>
+            </a:r>
+            <a:endParaRPr lang="de-DE" dirty="0"/>
+          </a:p>
+        </p:txBody>
+      </p:sp>
+      <p:sp>
+        <p:nvSpPr>
+          <p:cNvPr id="5" name="Foliennummernplatzhalter 4">
+            <a:extLst>
+              <a:ext uri="{FF2B5EF4-FFF2-40B4-BE49-F238E27FC236}">
+                <a16:creationId xmlns:a16="http://schemas.microsoft.com/office/drawing/2014/main" id="{8664D8E7-A42C-464E-9B7F-76B706DD6B67}"/>
+              </a:ext>
+            </a:extLst>
+          </p:cNvPr>
+          <p:cNvSpPr>
+            <a:spLocks noGrp="1"/>
+          </p:cNvSpPr>
+          <p:nvPr>
+            <p:ph type="sldNum" sz="quarter" idx="12"/>
+          </p:nvPr>
+        </p:nvSpPr>
+        <p:spPr/>
+        <p:txBody>
+          <a:bodyPr/>
+          <a:lstStyle/>
+          <a:p>
+            <a:fld id="{E07F1749-2C29-4AD9-BF92-E70F8884412B}" type="slidenum">
+              <a:rPr lang="de-DE" smtClean="0"/>
+              <a:t>40</a:t>
+            </a:fld>
+            <a:endParaRPr lang="de-DE"/>
+          </a:p>
+        </p:txBody>
+      </p:sp>
+      <p:sp>
+        <p:nvSpPr>
+          <p:cNvPr id="6" name="Inhaltsplatzhalter 5">
+            <a:extLst>
+              <a:ext uri="{FF2B5EF4-FFF2-40B4-BE49-F238E27FC236}">
+                <a16:creationId xmlns:a16="http://schemas.microsoft.com/office/drawing/2014/main" id="{81BB93A8-BC51-435F-8D7C-F98C8F80D605}"/>
+              </a:ext>
+            </a:extLst>
+          </p:cNvPr>
+          <p:cNvSpPr>
+            <a:spLocks noGrp="1"/>
+          </p:cNvSpPr>
+          <p:nvPr>
+            <p:ph sz="quarter" idx="13"/>
+          </p:nvPr>
+        </p:nvSpPr>
+        <p:spPr/>
+        <p:txBody>
+          <a:bodyPr/>
+          <a:lstStyle/>
+          <a:p>
+            <a:r>
+              <a:rPr lang="de-CH" dirty="0"/>
+              <a:t>Behebe folgende Fehler in der Applikation:</a:t>
+            </a:r>
+          </a:p>
+          <a:p>
+            <a:pPr marL="342900" indent="-342900">
+              <a:buFont typeface="Arial" panose="020B0604020202020204" pitchFamily="34" charset="0"/>
+              <a:buChar char="•"/>
+            </a:pPr>
+            <a:r>
+              <a:rPr lang="de-CH" dirty="0"/>
+              <a:t>Eingabe entprellen (</a:t>
+            </a:r>
+            <a:r>
+              <a:rPr lang="de-CH" dirty="0" err="1"/>
+              <a:t>debounceTime</a:t>
+            </a:r>
+            <a:r>
+              <a:rPr lang="de-CH" dirty="0"/>
+              <a:t>)</a:t>
+            </a:r>
+          </a:p>
+          <a:p>
+            <a:pPr marL="342900" indent="-342900">
+              <a:buFont typeface="Arial" panose="020B0604020202020204" pitchFamily="34" charset="0"/>
+              <a:buChar char="•"/>
+            </a:pPr>
+            <a:r>
+              <a:rPr lang="de-CH" dirty="0"/>
+              <a:t>Überholende Responses (</a:t>
+            </a:r>
+            <a:r>
+              <a:rPr lang="de-CH" dirty="0" err="1"/>
+              <a:t>switchMap</a:t>
+            </a:r>
+            <a:r>
+              <a:rPr lang="de-CH" dirty="0"/>
+              <a:t>)</a:t>
+            </a:r>
+          </a:p>
+          <a:p>
+            <a:pPr marL="342900" indent="-342900">
+              <a:buFont typeface="Arial" panose="020B0604020202020204" pitchFamily="34" charset="0"/>
+              <a:buChar char="•"/>
+            </a:pPr>
+            <a:r>
+              <a:rPr lang="de-CH" dirty="0"/>
+              <a:t>Fehler vom REST-Server abfangen</a:t>
+            </a:r>
+            <a:br>
+              <a:rPr lang="de-CH" dirty="0"/>
+            </a:br>
+            <a:r>
+              <a:rPr lang="de-CH" dirty="0"/>
+              <a:t>Die Eingabe «</a:t>
+            </a:r>
+            <a:r>
+              <a:rPr lang="de-CH" dirty="0" err="1"/>
+              <a:t>errror</a:t>
+            </a:r>
+            <a:r>
+              <a:rPr lang="de-CH" dirty="0"/>
+              <a:t>» erzeugt einen Fehler</a:t>
+            </a:r>
+          </a:p>
+        </p:txBody>
+      </p:sp>
+    </p:spTree>
+    <p:extLst>
+      <p:ext uri="{BB962C8B-B14F-4D97-AF65-F5344CB8AC3E}">
+        <p14:creationId xmlns:p14="http://schemas.microsoft.com/office/powerpoint/2010/main" val="1000590713"/>
+      </p:ext>
+    </p:extLst>
+  </p:cSld>
+  <p:clrMapOvr>
+    <a:masterClrMapping/>
+  </p:clrMapOvr>
+</p:sld>
+</file>
+
+<file path=ppt/slides/slide41.xml><?xml version="1.0" encoding="utf-8"?>
+<p:sld xmlns:a="http://schemas.openxmlformats.org/drawingml/2006/main" xmlns:r="http://schemas.openxmlformats.org/officeDocument/2006/relationships" xmlns:p="http://schemas.openxmlformats.org/presentationml/2006/main">
+  <p:cSld>
+    <p:spTree>
+      <p:nvGrpSpPr>
+        <p:cNvPr id="1" name=""/>
+        <p:cNvGrpSpPr/>
+        <p:nvPr/>
+      </p:nvGrpSpPr>
+      <p:grpSpPr>
+        <a:xfrm>
+          <a:off x="0" y="0"/>
+          <a:ext cx="0" cy="0"/>
+          <a:chOff x="0" y="0"/>
+          <a:chExt cx="0" cy="0"/>
+        </a:xfrm>
+      </p:grpSpPr>
+      <p:sp>
+        <p:nvSpPr>
+          <p:cNvPr id="2" name="Titel 1">
+            <a:extLst>
+              <a:ext uri="{FF2B5EF4-FFF2-40B4-BE49-F238E27FC236}">
+                <a16:creationId xmlns:a16="http://schemas.microsoft.com/office/drawing/2014/main" id="{3D9E3DB6-E079-4155-89D5-D19C3244F995}"/>
+              </a:ext>
+            </a:extLst>
+          </p:cNvPr>
+          <p:cNvSpPr>
+            <a:spLocks noGrp="1"/>
+          </p:cNvSpPr>
+          <p:nvPr>
+            <p:ph type="title"/>
+          </p:nvPr>
+        </p:nvSpPr>
+        <p:spPr/>
+        <p:txBody>
+          <a:bodyPr/>
+          <a:lstStyle/>
+          <a:p>
+            <a:r>
+              <a:rPr lang="de-CH" dirty="0"/>
+              <a:t>Übung 8</a:t>
+            </a:r>
+          </a:p>
+        </p:txBody>
+      </p:sp>
+      <p:sp>
+        <p:nvSpPr>
+          <p:cNvPr id="3" name="Datumsplatzhalter 2">
+            <a:extLst>
+              <a:ext uri="{FF2B5EF4-FFF2-40B4-BE49-F238E27FC236}">
+                <a16:creationId xmlns:a16="http://schemas.microsoft.com/office/drawing/2014/main" id="{DCB6844D-F535-4539-88F3-C4117BF62275}"/>
+              </a:ext>
+            </a:extLst>
+          </p:cNvPr>
+          <p:cNvSpPr>
+            <a:spLocks noGrp="1"/>
+          </p:cNvSpPr>
+          <p:nvPr>
+            <p:ph type="dt" sz="half" idx="10"/>
+          </p:nvPr>
+        </p:nvSpPr>
+        <p:spPr/>
+        <p:txBody>
+          <a:bodyPr/>
+          <a:lstStyle/>
+          <a:p>
+            <a:fld id="{48352B5A-167D-4ED6-B7C9-BDA647A8BA51}" type="datetime1">
+              <a:rPr lang="de-DE" smtClean="0"/>
+              <a:t>30.10.2018</a:t>
+            </a:fld>
+            <a:endParaRPr lang="de-DE"/>
+          </a:p>
+        </p:txBody>
+      </p:sp>
+      <p:sp>
+        <p:nvSpPr>
+          <p:cNvPr id="4" name="Fußzeilenplatzhalter 3">
+            <a:extLst>
+              <a:ext uri="{FF2B5EF4-FFF2-40B4-BE49-F238E27FC236}">
+                <a16:creationId xmlns:a16="http://schemas.microsoft.com/office/drawing/2014/main" id="{746D5D54-CC5C-46C6-B201-B8FB7846A6C2}"/>
+              </a:ext>
+            </a:extLst>
+          </p:cNvPr>
+          <p:cNvSpPr>
+            <a:spLocks noGrp="1"/>
+          </p:cNvSpPr>
+          <p:nvPr>
+            <p:ph type="ftr" sz="quarter" idx="11"/>
+          </p:nvPr>
+        </p:nvSpPr>
+        <p:spPr/>
+        <p:txBody>
+          <a:bodyPr/>
+          <a:lstStyle/>
+          <a:p>
+            <a:r>
+              <a:rPr lang="de-DE"/>
+              <a:t>React, Materialize, RxJS</a:t>
+            </a:r>
+            <a:endParaRPr lang="de-DE" dirty="0"/>
+          </a:p>
+        </p:txBody>
+      </p:sp>
+      <p:sp>
+        <p:nvSpPr>
+          <p:cNvPr id="5" name="Foliennummernplatzhalter 4">
+            <a:extLst>
+              <a:ext uri="{FF2B5EF4-FFF2-40B4-BE49-F238E27FC236}">
+                <a16:creationId xmlns:a16="http://schemas.microsoft.com/office/drawing/2014/main" id="{02A68321-6735-447E-BFEB-F6BAD059A0BB}"/>
+              </a:ext>
+            </a:extLst>
+          </p:cNvPr>
+          <p:cNvSpPr>
+            <a:spLocks noGrp="1"/>
+          </p:cNvSpPr>
+          <p:nvPr>
+            <p:ph type="sldNum" sz="quarter" idx="12"/>
+          </p:nvPr>
+        </p:nvSpPr>
+        <p:spPr/>
+        <p:txBody>
+          <a:bodyPr/>
+          <a:lstStyle/>
+          <a:p>
+            <a:fld id="{E07F1749-2C29-4AD9-BF92-E70F8884412B}" type="slidenum">
+              <a:rPr lang="de-DE" smtClean="0"/>
+              <a:t>41</a:t>
+            </a:fld>
+            <a:endParaRPr lang="de-DE"/>
+          </a:p>
+        </p:txBody>
+      </p:sp>
+      <p:sp>
+        <p:nvSpPr>
+          <p:cNvPr id="6" name="Inhaltsplatzhalter 5">
+            <a:extLst>
+              <a:ext uri="{FF2B5EF4-FFF2-40B4-BE49-F238E27FC236}">
+                <a16:creationId xmlns:a16="http://schemas.microsoft.com/office/drawing/2014/main" id="{C3CF6BD0-1B5A-4AC1-B6BD-184F310F4BD8}"/>
+              </a:ext>
+            </a:extLst>
+          </p:cNvPr>
+          <p:cNvSpPr>
+            <a:spLocks noGrp="1"/>
+          </p:cNvSpPr>
+          <p:nvPr>
+            <p:ph sz="quarter" idx="13"/>
+          </p:nvPr>
+        </p:nvSpPr>
+        <p:spPr/>
+        <p:txBody>
+          <a:bodyPr/>
+          <a:lstStyle/>
+          <a:p>
+            <a:pPr>
+              <a:lnSpc>
+                <a:spcPct val="100000"/>
+              </a:lnSpc>
+              <a:spcBef>
+                <a:spcPts val="0"/>
+              </a:spcBef>
+            </a:pPr>
+            <a:r>
+              <a:rPr lang="en-US" sz="1800" dirty="0">
+                <a:latin typeface="Courier New" panose="02070309020205020404" pitchFamily="49" charset="0"/>
+                <a:cs typeface="Courier New" panose="02070309020205020404" pitchFamily="49" charset="0"/>
+              </a:rPr>
+              <a:t>class </a:t>
+            </a:r>
+            <a:r>
+              <a:rPr lang="en-US" sz="1800" dirty="0" err="1">
+                <a:latin typeface="Courier New" panose="02070309020205020404" pitchFamily="49" charset="0"/>
+                <a:cs typeface="Courier New" panose="02070309020205020404" pitchFamily="49" charset="0"/>
+              </a:rPr>
+              <a:t>PersonSearchPanel</a:t>
+            </a:r>
+            <a:r>
+              <a:rPr lang="en-US" sz="1800" dirty="0">
+                <a:latin typeface="Courier New" panose="02070309020205020404" pitchFamily="49" charset="0"/>
+                <a:cs typeface="Courier New" panose="02070309020205020404" pitchFamily="49" charset="0"/>
+              </a:rPr>
+              <a:t> extends </a:t>
+            </a:r>
+            <a:r>
+              <a:rPr lang="en-US" sz="1800" dirty="0" err="1">
+                <a:latin typeface="Courier New" panose="02070309020205020404" pitchFamily="49" charset="0"/>
+                <a:cs typeface="Courier New" panose="02070309020205020404" pitchFamily="49" charset="0"/>
+              </a:rPr>
+              <a:t>React.Component</a:t>
+            </a:r>
+            <a:r>
+              <a:rPr lang="en-US" sz="1800" dirty="0">
+                <a:latin typeface="Courier New" panose="02070309020205020404" pitchFamily="49" charset="0"/>
+                <a:cs typeface="Courier New" panose="02070309020205020404" pitchFamily="49" charset="0"/>
+              </a:rPr>
+              <a:t> {</a:t>
+            </a:r>
+          </a:p>
+          <a:p>
+            <a:pPr>
+              <a:lnSpc>
+                <a:spcPct val="100000"/>
+              </a:lnSpc>
+              <a:spcBef>
+                <a:spcPts val="0"/>
+              </a:spcBef>
+            </a:pPr>
+            <a:endParaRPr lang="en-US" sz="1800" dirty="0">
+              <a:latin typeface="Courier New" panose="02070309020205020404" pitchFamily="49" charset="0"/>
+              <a:cs typeface="Courier New" panose="02070309020205020404" pitchFamily="49" charset="0"/>
+            </a:endParaRPr>
+          </a:p>
+          <a:p>
+            <a:pPr>
+              <a:lnSpc>
+                <a:spcPct val="100000"/>
+              </a:lnSpc>
+              <a:spcBef>
+                <a:spcPts val="0"/>
+              </a:spcBef>
+            </a:pPr>
+            <a:r>
+              <a:rPr lang="en-US" sz="1800" dirty="0">
+                <a:latin typeface="Courier New" panose="02070309020205020404" pitchFamily="49" charset="0"/>
+                <a:cs typeface="Courier New" panose="02070309020205020404" pitchFamily="49" charset="0"/>
+              </a:rPr>
+              <a:t>  </a:t>
+            </a:r>
+            <a:r>
+              <a:rPr lang="de-CH" sz="1800" dirty="0" err="1">
+                <a:latin typeface="Courier New" panose="02070309020205020404" pitchFamily="49" charset="0"/>
+                <a:cs typeface="Courier New" panose="02070309020205020404" pitchFamily="49" charset="0"/>
+              </a:rPr>
+              <a:t>eventTarget</a:t>
+            </a:r>
+            <a:r>
+              <a:rPr lang="de-CH" sz="1800" dirty="0">
+                <a:latin typeface="Courier New" panose="02070309020205020404" pitchFamily="49" charset="0"/>
+                <a:cs typeface="Courier New" panose="02070309020205020404" pitchFamily="49" charset="0"/>
+              </a:rPr>
+              <a:t> = </a:t>
+            </a:r>
+            <a:r>
+              <a:rPr lang="de-CH" sz="1800" dirty="0" err="1">
+                <a:latin typeface="Courier New" panose="02070309020205020404" pitchFamily="49" charset="0"/>
+                <a:cs typeface="Courier New" panose="02070309020205020404" pitchFamily="49" charset="0"/>
+              </a:rPr>
+              <a:t>new</a:t>
+            </a:r>
+            <a:r>
+              <a:rPr lang="de-CH" sz="1800" dirty="0">
+                <a:latin typeface="Courier New" panose="02070309020205020404" pitchFamily="49" charset="0"/>
+                <a:cs typeface="Courier New" panose="02070309020205020404" pitchFamily="49" charset="0"/>
+              </a:rPr>
+              <a:t> </a:t>
+            </a:r>
+            <a:r>
+              <a:rPr lang="de-CH" sz="1800" dirty="0" err="1">
+                <a:latin typeface="Courier New" panose="02070309020205020404" pitchFamily="49" charset="0"/>
+                <a:cs typeface="Courier New" panose="02070309020205020404" pitchFamily="49" charset="0"/>
+              </a:rPr>
+              <a:t>EventTarget</a:t>
+            </a:r>
+            <a:r>
+              <a:rPr lang="de-CH" sz="1800" dirty="0">
+                <a:latin typeface="Courier New" panose="02070309020205020404" pitchFamily="49" charset="0"/>
+                <a:cs typeface="Courier New" panose="02070309020205020404" pitchFamily="49" charset="0"/>
+              </a:rPr>
+              <a:t>();</a:t>
+            </a:r>
+          </a:p>
+          <a:p>
+            <a:pPr>
+              <a:lnSpc>
+                <a:spcPct val="100000"/>
+              </a:lnSpc>
+              <a:spcBef>
+                <a:spcPts val="0"/>
+              </a:spcBef>
+            </a:pPr>
+            <a:endParaRPr lang="en-US" sz="1800" dirty="0">
+              <a:latin typeface="Courier New" panose="02070309020205020404" pitchFamily="49" charset="0"/>
+              <a:cs typeface="Courier New" panose="02070309020205020404" pitchFamily="49" charset="0"/>
+            </a:endParaRPr>
+          </a:p>
+          <a:p>
+            <a:pPr>
+              <a:lnSpc>
+                <a:spcPct val="100000"/>
+              </a:lnSpc>
+              <a:spcBef>
+                <a:spcPts val="0"/>
+              </a:spcBef>
+            </a:pPr>
+            <a:r>
+              <a:rPr lang="en-US" sz="1800" dirty="0">
+                <a:latin typeface="Courier New" panose="02070309020205020404" pitchFamily="49" charset="0"/>
+                <a:cs typeface="Courier New" panose="02070309020205020404" pitchFamily="49" charset="0"/>
+              </a:rPr>
+              <a:t>  </a:t>
+            </a:r>
+            <a:r>
+              <a:rPr lang="en-US" sz="1800" dirty="0" err="1">
+                <a:latin typeface="Courier New" panose="02070309020205020404" pitchFamily="49" charset="0"/>
+                <a:cs typeface="Courier New" panose="02070309020205020404" pitchFamily="49" charset="0"/>
+              </a:rPr>
+              <a:t>componentDidMount</a:t>
+            </a:r>
+            <a:r>
+              <a:rPr lang="en-US" sz="1800" dirty="0">
+                <a:latin typeface="Courier New" panose="02070309020205020404" pitchFamily="49" charset="0"/>
+                <a:cs typeface="Courier New" panose="02070309020205020404" pitchFamily="49" charset="0"/>
+              </a:rPr>
+              <a:t>() {</a:t>
+            </a:r>
+          </a:p>
+          <a:p>
+            <a:pPr>
+              <a:lnSpc>
+                <a:spcPct val="100000"/>
+              </a:lnSpc>
+              <a:spcBef>
+                <a:spcPts val="0"/>
+              </a:spcBef>
+            </a:pPr>
+            <a:r>
+              <a:rPr lang="en-US" sz="1800" dirty="0">
+                <a:latin typeface="Courier New" panose="02070309020205020404" pitchFamily="49" charset="0"/>
+                <a:cs typeface="Courier New" panose="02070309020205020404" pitchFamily="49" charset="0"/>
+              </a:rPr>
+              <a:t>    </a:t>
+            </a:r>
+            <a:r>
+              <a:rPr lang="en-US" sz="1800" dirty="0" err="1">
+                <a:latin typeface="Courier New" panose="02070309020205020404" pitchFamily="49" charset="0"/>
+                <a:cs typeface="Courier New" panose="02070309020205020404" pitchFamily="49" charset="0"/>
+              </a:rPr>
+              <a:t>fromEvent</a:t>
+            </a:r>
+            <a:r>
+              <a:rPr lang="en-US" sz="1800" dirty="0">
+                <a:latin typeface="Courier New" panose="02070309020205020404" pitchFamily="49" charset="0"/>
+                <a:cs typeface="Courier New" panose="02070309020205020404" pitchFamily="49" charset="0"/>
+              </a:rPr>
+              <a:t>(</a:t>
+            </a:r>
+            <a:r>
+              <a:rPr lang="en-US" sz="1800" dirty="0" err="1">
+                <a:latin typeface="Courier New" panose="02070309020205020404" pitchFamily="49" charset="0"/>
+                <a:cs typeface="Courier New" panose="02070309020205020404" pitchFamily="49" charset="0"/>
+              </a:rPr>
+              <a:t>this.eventTarget</a:t>
+            </a:r>
+            <a:r>
+              <a:rPr lang="en-US" sz="1800" dirty="0">
+                <a:latin typeface="Courier New" panose="02070309020205020404" pitchFamily="49" charset="0"/>
+                <a:cs typeface="Courier New" panose="02070309020205020404" pitchFamily="49" charset="0"/>
+              </a:rPr>
+              <a:t>, "</a:t>
+            </a:r>
+            <a:r>
+              <a:rPr lang="en-US" sz="1800" dirty="0" err="1">
+                <a:latin typeface="Courier New" panose="02070309020205020404" pitchFamily="49" charset="0"/>
+                <a:cs typeface="Courier New" panose="02070309020205020404" pitchFamily="49" charset="0"/>
+              </a:rPr>
+              <a:t>OnChange</a:t>
+            </a:r>
+            <a:r>
+              <a:rPr lang="en-US" sz="1800" dirty="0">
+                <a:latin typeface="Courier New" panose="02070309020205020404" pitchFamily="49" charset="0"/>
+                <a:cs typeface="Courier New" panose="02070309020205020404" pitchFamily="49" charset="0"/>
+              </a:rPr>
+              <a:t>")</a:t>
+            </a:r>
+          </a:p>
+          <a:p>
+            <a:pPr>
+              <a:lnSpc>
+                <a:spcPct val="100000"/>
+              </a:lnSpc>
+              <a:spcBef>
+                <a:spcPts val="0"/>
+              </a:spcBef>
+            </a:pPr>
+            <a:r>
+              <a:rPr lang="de-CH" sz="1800" dirty="0">
+                <a:latin typeface="Courier New" panose="02070309020205020404" pitchFamily="49" charset="0"/>
+                <a:cs typeface="Courier New" panose="02070309020205020404" pitchFamily="49" charset="0"/>
+              </a:rPr>
+              <a:t>    ...</a:t>
+            </a:r>
+          </a:p>
+          <a:p>
+            <a:pPr>
+              <a:lnSpc>
+                <a:spcPct val="100000"/>
+              </a:lnSpc>
+              <a:spcBef>
+                <a:spcPts val="0"/>
+              </a:spcBef>
+            </a:pPr>
+            <a:r>
+              <a:rPr lang="de-CH" sz="1800" dirty="0">
+                <a:latin typeface="Courier New" panose="02070309020205020404" pitchFamily="49" charset="0"/>
+                <a:cs typeface="Courier New" panose="02070309020205020404" pitchFamily="49" charset="0"/>
+              </a:rPr>
+              <a:t>  }</a:t>
+            </a:r>
+          </a:p>
+          <a:p>
+            <a:pPr>
+              <a:lnSpc>
+                <a:spcPct val="100000"/>
+              </a:lnSpc>
+              <a:spcBef>
+                <a:spcPts val="0"/>
+              </a:spcBef>
+            </a:pPr>
+            <a:endParaRPr lang="en-US" sz="1800" dirty="0">
+              <a:latin typeface="Courier New" panose="02070309020205020404" pitchFamily="49" charset="0"/>
+              <a:cs typeface="Courier New" panose="02070309020205020404" pitchFamily="49" charset="0"/>
+            </a:endParaRPr>
+          </a:p>
+          <a:p>
+            <a:pPr>
+              <a:lnSpc>
+                <a:spcPct val="100000"/>
+              </a:lnSpc>
+              <a:spcBef>
+                <a:spcPts val="0"/>
+              </a:spcBef>
+            </a:pPr>
+            <a:r>
+              <a:rPr lang="en-US" sz="1800" dirty="0">
+                <a:latin typeface="Courier New" panose="02070309020205020404" pitchFamily="49" charset="0"/>
+                <a:cs typeface="Courier New" panose="02070309020205020404" pitchFamily="49" charset="0"/>
+              </a:rPr>
+              <a:t>  </a:t>
+            </a:r>
+            <a:r>
+              <a:rPr lang="en-US" sz="1800" dirty="0" err="1">
+                <a:latin typeface="Courier New" panose="02070309020205020404" pitchFamily="49" charset="0"/>
+                <a:cs typeface="Courier New" panose="02070309020205020404" pitchFamily="49" charset="0"/>
+              </a:rPr>
+              <a:t>onChange</a:t>
+            </a:r>
+            <a:r>
+              <a:rPr lang="en-US" sz="1800" dirty="0">
+                <a:latin typeface="Courier New" panose="02070309020205020404" pitchFamily="49" charset="0"/>
+                <a:cs typeface="Courier New" panose="02070309020205020404" pitchFamily="49" charset="0"/>
+              </a:rPr>
+              <a:t>(text) {</a:t>
+            </a:r>
+          </a:p>
+          <a:p>
+            <a:pPr>
+              <a:lnSpc>
+                <a:spcPct val="100000"/>
+              </a:lnSpc>
+              <a:spcBef>
+                <a:spcPts val="0"/>
+              </a:spcBef>
+            </a:pPr>
+            <a:r>
+              <a:rPr lang="en-US" sz="1800" dirty="0">
+                <a:latin typeface="Courier New" panose="02070309020205020404" pitchFamily="49" charset="0"/>
+                <a:cs typeface="Courier New" panose="02070309020205020404" pitchFamily="49" charset="0"/>
+              </a:rPr>
+              <a:t>    </a:t>
+            </a:r>
+            <a:r>
+              <a:rPr lang="en-US" sz="1800" dirty="0" err="1">
+                <a:latin typeface="Courier New" panose="02070309020205020404" pitchFamily="49" charset="0"/>
+                <a:cs typeface="Courier New" panose="02070309020205020404" pitchFamily="49" charset="0"/>
+              </a:rPr>
+              <a:t>this.eventTarget.dispatchEvent</a:t>
+            </a:r>
+            <a:r>
+              <a:rPr lang="en-US" sz="1800" dirty="0">
+                <a:latin typeface="Courier New" panose="02070309020205020404" pitchFamily="49" charset="0"/>
+                <a:cs typeface="Courier New" panose="02070309020205020404" pitchFamily="49" charset="0"/>
+              </a:rPr>
+              <a:t>(</a:t>
+            </a:r>
+          </a:p>
+          <a:p>
+            <a:pPr>
+              <a:lnSpc>
+                <a:spcPct val="100000"/>
+              </a:lnSpc>
+              <a:spcBef>
+                <a:spcPts val="0"/>
+              </a:spcBef>
+            </a:pPr>
+            <a:r>
+              <a:rPr lang="en-US" sz="1800" dirty="0">
+                <a:latin typeface="Courier New" panose="02070309020205020404" pitchFamily="49" charset="0"/>
+                <a:cs typeface="Courier New" panose="02070309020205020404" pitchFamily="49" charset="0"/>
+              </a:rPr>
+              <a:t>      new </a:t>
+            </a:r>
+            <a:r>
+              <a:rPr lang="en-US" sz="1800" dirty="0" err="1">
+                <a:latin typeface="Courier New" panose="02070309020205020404" pitchFamily="49" charset="0"/>
+                <a:cs typeface="Courier New" panose="02070309020205020404" pitchFamily="49" charset="0"/>
+              </a:rPr>
+              <a:t>CustomEvent</a:t>
+            </a:r>
+            <a:r>
+              <a:rPr lang="en-US" sz="1800" dirty="0">
+                <a:latin typeface="Courier New" panose="02070309020205020404" pitchFamily="49" charset="0"/>
+                <a:cs typeface="Courier New" panose="02070309020205020404" pitchFamily="49" charset="0"/>
+              </a:rPr>
+              <a:t>('</a:t>
+            </a:r>
+            <a:r>
+              <a:rPr lang="en-US" sz="1800" dirty="0" err="1">
+                <a:latin typeface="Courier New" panose="02070309020205020404" pitchFamily="49" charset="0"/>
+                <a:cs typeface="Courier New" panose="02070309020205020404" pitchFamily="49" charset="0"/>
+              </a:rPr>
+              <a:t>OnChange</a:t>
+            </a:r>
+            <a:r>
+              <a:rPr lang="en-US" sz="1800" dirty="0">
+                <a:latin typeface="Courier New" panose="02070309020205020404" pitchFamily="49" charset="0"/>
+                <a:cs typeface="Courier New" panose="02070309020205020404" pitchFamily="49" charset="0"/>
+              </a:rPr>
+              <a:t>', { detail: text })</a:t>
+            </a:r>
+          </a:p>
+          <a:p>
+            <a:pPr>
+              <a:lnSpc>
+                <a:spcPct val="100000"/>
+              </a:lnSpc>
+              <a:spcBef>
+                <a:spcPts val="0"/>
+              </a:spcBef>
+            </a:pPr>
+            <a:r>
+              <a:rPr lang="en-US" sz="1800" dirty="0">
+                <a:latin typeface="Courier New" panose="02070309020205020404" pitchFamily="49" charset="0"/>
+                <a:cs typeface="Courier New" panose="02070309020205020404" pitchFamily="49" charset="0"/>
+              </a:rPr>
+              <a:t>    );</a:t>
+            </a:r>
+            <a:endParaRPr lang="de-CH" sz="1800" dirty="0">
+              <a:latin typeface="Courier New" panose="02070309020205020404" pitchFamily="49" charset="0"/>
+              <a:cs typeface="Courier New" panose="02070309020205020404" pitchFamily="49" charset="0"/>
+            </a:endParaRPr>
+          </a:p>
+          <a:p>
+            <a:pPr>
+              <a:lnSpc>
+                <a:spcPct val="100000"/>
+              </a:lnSpc>
+              <a:spcBef>
+                <a:spcPts val="0"/>
+              </a:spcBef>
+            </a:pPr>
+            <a:r>
+              <a:rPr lang="de-CH" sz="1800" dirty="0">
+                <a:latin typeface="Courier New" panose="02070309020205020404" pitchFamily="49" charset="0"/>
+                <a:cs typeface="Courier New" panose="02070309020205020404" pitchFamily="49" charset="0"/>
+              </a:rPr>
+              <a:t>  }</a:t>
+            </a:r>
+          </a:p>
+          <a:p>
+            <a:pPr>
+              <a:lnSpc>
+                <a:spcPct val="100000"/>
+              </a:lnSpc>
+              <a:spcBef>
+                <a:spcPts val="0"/>
+              </a:spcBef>
+            </a:pPr>
+            <a:endParaRPr lang="de-CH" sz="1800" dirty="0">
+              <a:latin typeface="Courier New" panose="02070309020205020404" pitchFamily="49" charset="0"/>
+              <a:cs typeface="Courier New" panose="02070309020205020404" pitchFamily="49" charset="0"/>
+            </a:endParaRPr>
+          </a:p>
+          <a:p>
+            <a:pPr>
+              <a:lnSpc>
+                <a:spcPct val="100000"/>
+              </a:lnSpc>
+              <a:spcBef>
+                <a:spcPts val="0"/>
+              </a:spcBef>
+            </a:pPr>
+            <a:r>
+              <a:rPr lang="de-CH" sz="1800" dirty="0">
+                <a:latin typeface="Courier New" panose="02070309020205020404" pitchFamily="49" charset="0"/>
+                <a:cs typeface="Courier New" panose="02070309020205020404" pitchFamily="49" charset="0"/>
+              </a:rPr>
+              <a:t>  ...</a:t>
+            </a:r>
+          </a:p>
+          <a:p>
+            <a:pPr>
+              <a:lnSpc>
+                <a:spcPct val="100000"/>
+              </a:lnSpc>
+              <a:spcBef>
+                <a:spcPts val="0"/>
+              </a:spcBef>
+            </a:pPr>
+            <a:r>
+              <a:rPr lang="de-CH" sz="1800" dirty="0">
+                <a:latin typeface="Courier New" panose="02070309020205020404" pitchFamily="49" charset="0"/>
+                <a:cs typeface="Courier New" panose="02070309020205020404" pitchFamily="49" charset="0"/>
+              </a:rPr>
+              <a:t>}</a:t>
+            </a:r>
+            <a:endParaRPr lang="en-US" sz="1800" dirty="0">
+              <a:latin typeface="Courier New" panose="02070309020205020404" pitchFamily="49" charset="0"/>
+              <a:cs typeface="Courier New" panose="02070309020205020404" pitchFamily="49" charset="0"/>
+            </a:endParaRPr>
+          </a:p>
+        </p:txBody>
+      </p:sp>
+    </p:spTree>
+    <p:extLst>
+      <p:ext uri="{BB962C8B-B14F-4D97-AF65-F5344CB8AC3E}">
+        <p14:creationId xmlns:p14="http://schemas.microsoft.com/office/powerpoint/2010/main" val="18143729"/>
+      </p:ext>
+    </p:extLst>
+  </p:cSld>
+  <p:clrMapOvr>
+    <a:masterClrMapping/>
+  </p:clrMapOvr>
+</p:sld>
+</file>
+
+<file path=ppt/slides/slide42.xml><?xml version="1.0" encoding="utf-8"?>
+<p:sld xmlns:a="http://schemas.openxmlformats.org/drawingml/2006/main" xmlns:r="http://schemas.openxmlformats.org/officeDocument/2006/relationships" xmlns:p="http://schemas.openxmlformats.org/presentationml/2006/main">
+  <p:cSld>
+    <p:spTree>
+      <p:nvGrpSpPr>
+        <p:cNvPr id="1" name=""/>
+        <p:cNvGrpSpPr/>
+        <p:nvPr/>
+      </p:nvGrpSpPr>
+      <p:grpSpPr>
+        <a:xfrm>
+          <a:off x="0" y="0"/>
+          <a:ext cx="0" cy="0"/>
+          <a:chOff x="0" y="0"/>
+          <a:chExt cx="0" cy="0"/>
+        </a:xfrm>
+      </p:grpSpPr>
+      <p:sp>
+        <p:nvSpPr>
+          <p:cNvPr id="2" name="Titel 1">
+            <a:extLst>
+              <a:ext uri="{FF2B5EF4-FFF2-40B4-BE49-F238E27FC236}">
+                <a16:creationId xmlns:a16="http://schemas.microsoft.com/office/drawing/2014/main" id="{ED2502C0-07E1-4EF7-8B9F-7CC88DD45A42}"/>
+              </a:ext>
+            </a:extLst>
+          </p:cNvPr>
+          <p:cNvSpPr>
+            <a:spLocks noGrp="1"/>
+          </p:cNvSpPr>
+          <p:nvPr>
+            <p:ph type="title"/>
+          </p:nvPr>
+        </p:nvSpPr>
+        <p:spPr/>
+        <p:txBody>
+          <a:bodyPr/>
+          <a:lstStyle/>
+          <a:p>
+            <a:endParaRPr lang="de-CH" dirty="0"/>
+          </a:p>
+        </p:txBody>
+      </p:sp>
+      <p:sp>
+        <p:nvSpPr>
+          <p:cNvPr id="3" name="Datumsplatzhalter 2">
+            <a:extLst>
+              <a:ext uri="{FF2B5EF4-FFF2-40B4-BE49-F238E27FC236}">
+                <a16:creationId xmlns:a16="http://schemas.microsoft.com/office/drawing/2014/main" id="{21B703D7-08E5-4A11-BE2A-3D91F63A4D2F}"/>
+              </a:ext>
+            </a:extLst>
+          </p:cNvPr>
+          <p:cNvSpPr>
+            <a:spLocks noGrp="1"/>
+          </p:cNvSpPr>
+          <p:nvPr>
+            <p:ph type="dt" sz="half" idx="10"/>
+          </p:nvPr>
+        </p:nvSpPr>
+        <p:spPr/>
+        <p:txBody>
+          <a:bodyPr/>
+          <a:lstStyle/>
+          <a:p>
+            <a:fld id="{48352B5A-167D-4ED6-B7C9-BDA647A8BA51}" type="datetime1">
+              <a:rPr lang="de-DE" smtClean="0"/>
+              <a:t>30.10.2018</a:t>
+            </a:fld>
+            <a:endParaRPr lang="de-DE"/>
+          </a:p>
+        </p:txBody>
+      </p:sp>
+      <p:sp>
+        <p:nvSpPr>
+          <p:cNvPr id="4" name="Fußzeilenplatzhalter 3">
+            <a:extLst>
+              <a:ext uri="{FF2B5EF4-FFF2-40B4-BE49-F238E27FC236}">
+                <a16:creationId xmlns:a16="http://schemas.microsoft.com/office/drawing/2014/main" id="{2799829B-12F3-499F-8EFF-EBEADA63D668}"/>
+              </a:ext>
+            </a:extLst>
+          </p:cNvPr>
+          <p:cNvSpPr>
+            <a:spLocks noGrp="1"/>
+          </p:cNvSpPr>
+          <p:nvPr>
+            <p:ph type="ftr" sz="quarter" idx="11"/>
+          </p:nvPr>
+        </p:nvSpPr>
+        <p:spPr/>
+        <p:txBody>
+          <a:bodyPr/>
+          <a:lstStyle/>
+          <a:p>
+            <a:r>
+              <a:rPr lang="de-DE"/>
+              <a:t>React, Materialize, RxJS</a:t>
+            </a:r>
+            <a:endParaRPr lang="de-DE" dirty="0"/>
+          </a:p>
+        </p:txBody>
+      </p:sp>
+      <p:sp>
+        <p:nvSpPr>
+          <p:cNvPr id="5" name="Foliennummernplatzhalter 4">
+            <a:extLst>
+              <a:ext uri="{FF2B5EF4-FFF2-40B4-BE49-F238E27FC236}">
+                <a16:creationId xmlns:a16="http://schemas.microsoft.com/office/drawing/2014/main" id="{13FBF7CA-0F71-4E12-818C-DAB213A78389}"/>
+              </a:ext>
+            </a:extLst>
+          </p:cNvPr>
+          <p:cNvSpPr>
+            <a:spLocks noGrp="1"/>
+          </p:cNvSpPr>
+          <p:nvPr>
+            <p:ph type="sldNum" sz="quarter" idx="12"/>
+          </p:nvPr>
+        </p:nvSpPr>
+        <p:spPr/>
+        <p:txBody>
+          <a:bodyPr/>
+          <a:lstStyle/>
+          <a:p>
+            <a:fld id="{E07F1749-2C29-4AD9-BF92-E70F8884412B}" type="slidenum">
+              <a:rPr lang="de-DE" smtClean="0"/>
+              <a:t>42</a:t>
+            </a:fld>
+            <a:endParaRPr lang="de-DE"/>
+          </a:p>
+        </p:txBody>
+      </p:sp>
+      <p:sp>
+        <p:nvSpPr>
+          <p:cNvPr id="6" name="Inhaltsplatzhalter 5">
+            <a:extLst>
+              <a:ext uri="{FF2B5EF4-FFF2-40B4-BE49-F238E27FC236}">
+                <a16:creationId xmlns:a16="http://schemas.microsoft.com/office/drawing/2014/main" id="{652C66CB-1B0F-48B3-A59F-0EA6FE9A8A90}"/>
+              </a:ext>
+            </a:extLst>
+          </p:cNvPr>
+          <p:cNvSpPr>
+            <a:spLocks noGrp="1"/>
+          </p:cNvSpPr>
+          <p:nvPr>
+            <p:ph sz="quarter" idx="13"/>
+          </p:nvPr>
+        </p:nvSpPr>
+        <p:spPr/>
+        <p:txBody>
+          <a:bodyPr/>
+          <a:lstStyle/>
+          <a:p>
+            <a:pPr algn="ctr"/>
+            <a:r>
+              <a:rPr lang="de-CH" sz="6000" dirty="0"/>
+              <a:t>Vielen Dank für die Aufmerksamkeit und</a:t>
+            </a:r>
+          </a:p>
+          <a:p>
+            <a:pPr algn="ctr"/>
+            <a:r>
+              <a:rPr lang="de-CH" sz="6000" dirty="0"/>
+              <a:t>das aktive mitmachen</a:t>
+            </a:r>
+          </a:p>
+        </p:txBody>
+      </p:sp>
+    </p:spTree>
+    <p:extLst>
+      <p:ext uri="{BB962C8B-B14F-4D97-AF65-F5344CB8AC3E}">
+        <p14:creationId xmlns:p14="http://schemas.microsoft.com/office/powerpoint/2010/main" val="2233037035"/>
       </p:ext>
     </p:extLst>
   </p:cSld>
@@ -14204,7 +15985,7 @@
           <a:p>
             <a:fld id="{48352B5A-167D-4ED6-B7C9-BDA647A8BA51}" type="datetime1">
               <a:rPr lang="de-DE" smtClean="0"/>
-              <a:t>21.10.2018</a:t>
+              <a:t>30.10.2018</a:t>
             </a:fld>
             <a:endParaRPr lang="de-DE"/>
           </a:p>
@@ -14472,7 +16253,7 @@
           <a:p>
             <a:fld id="{48352B5A-167D-4ED6-B7C9-BDA647A8BA51}" type="datetime1">
               <a:rPr lang="de-DE" smtClean="0"/>
-              <a:t>21.10.2018</a:t>
+              <a:t>30.10.2018</a:t>
             </a:fld>
             <a:endParaRPr lang="de-DE"/>
           </a:p>
@@ -14711,7 +16492,7 @@
           <a:p>
             <a:fld id="{48352B5A-167D-4ED6-B7C9-BDA647A8BA51}" type="datetime1">
               <a:rPr lang="de-DE" smtClean="0"/>
-              <a:t>21.10.2018</a:t>
+              <a:t>30.10.2018</a:t>
             </a:fld>
             <a:endParaRPr lang="de-DE"/>
           </a:p>
@@ -15068,7 +16849,7 @@
           <a:p>
             <a:fld id="{48352B5A-167D-4ED6-B7C9-BDA647A8BA51}" type="datetime1">
               <a:rPr lang="de-DE" smtClean="0"/>
-              <a:t>21.10.2018</a:t>
+              <a:t>30.10.2018</a:t>
             </a:fld>
             <a:endParaRPr lang="de-DE"/>
           </a:p>
@@ -15307,7 +17088,7 @@
           <a:p>
             <a:fld id="{48352B5A-167D-4ED6-B7C9-BDA647A8BA51}" type="datetime1">
               <a:rPr lang="de-DE" smtClean="0"/>
-              <a:t>21.10.2018</a:t>
+              <a:t>30.10.2018</a:t>
             </a:fld>
             <a:endParaRPr lang="de-DE"/>
           </a:p>

</xml_diff>